<commit_message>
Updated powerpoint with comparison of gen10
</commit_message>
<xml_diff>
--- a/research/report/Apresentação.pptx
+++ b/research/report/Apresentação.pptx
@@ -128,7 +128,7 @@
   </p:defaultTextStyle>
   <p:extLst>
     <p:ext uri="{EFAFB233-063F-42B5-8137-9DF3F51BA10A}">
-      <p15:sldGuideLst xmlns:p15="http://schemas.microsoft.com/office/powerpoint/2012/main" xmlns="">
+      <p15:sldGuideLst xmlns="" xmlns:p15="http://schemas.microsoft.com/office/powerpoint/2012/main">
         <p15:guide id="1" orient="horz" pos="2160">
           <p15:clr>
             <a:srgbClr val="A4A3A4"/>
@@ -147,6 +147,7 @@
 
 <file path=ppt/charts/chart1.xml><?xml version="1.0" encoding="utf-8"?>
 <c:chartSpace xmlns:c="http://schemas.openxmlformats.org/drawingml/2006/chart" xmlns:a="http://schemas.openxmlformats.org/drawingml/2006/main" xmlns:r="http://schemas.openxmlformats.org/officeDocument/2006/relationships">
+  <c:date1904 val="1"/>
   <c:lang val="pt-PT"/>
   <c:chart>
     <c:title>
@@ -430,10 +431,10 @@
                   <c:v>3.06</c:v>
                 </c:pt>
                 <c:pt idx="1">
-                  <c:v>0.32200000000000006</c:v>
+                  <c:v>0.32200000000000012</c:v>
                 </c:pt>
                 <c:pt idx="2">
-                  <c:v>3.3299999999999996</c:v>
+                  <c:v>3.3299999999999992</c:v>
                 </c:pt>
                 <c:pt idx="3">
                   <c:v>3.17</c:v>
@@ -549,7 +550,7 @@
                   <c:v>1.06</c:v>
                 </c:pt>
                 <c:pt idx="2">
-                  <c:v>1.7200000000000002</c:v>
+                  <c:v>1.7200000000000004</c:v>
                 </c:pt>
                 <c:pt idx="3">
                   <c:v>2.17</c:v>
@@ -665,7 +666,7 @@
                   <c:v>0.98</c:v>
                 </c:pt>
                 <c:pt idx="2">
-                  <c:v>5.3599999999999994</c:v>
+                  <c:v>5.3599999999999985</c:v>
                 </c:pt>
                 <c:pt idx="3">
                   <c:v>5.21</c:v>
@@ -766,7 +767,7 @@
                   <c:v>3.54</c:v>
                 </c:pt>
                 <c:pt idx="1">
-                  <c:v>0.83000000000000007</c:v>
+                  <c:v>0.83000000000000018</c:v>
                 </c:pt>
                 <c:pt idx="2">
                   <c:v>3.73</c:v>
@@ -791,11 +792,11 @@
         </c:dLbls>
         <c:gapWidth val="444"/>
         <c:overlap val="-90"/>
-        <c:axId val="102079104"/>
-        <c:axId val="102097280"/>
+        <c:axId val="107587840"/>
+        <c:axId val="107593728"/>
       </c:barChart>
       <c:catAx>
-        <c:axId val="102079104"/>
+        <c:axId val="107587840"/>
         <c:scaling>
           <c:orientation val="minMax"/>
         </c:scaling>
@@ -850,14 +851,14 @@
             <a:endParaRPr lang="pt-PT"/>
           </a:p>
         </c:txPr>
-        <c:crossAx val="102097280"/>
+        <c:crossAx val="107593728"/>
         <c:crosses val="autoZero"/>
         <c:auto val="1"/>
         <c:lblAlgn val="ctr"/>
         <c:lblOffset val="100"/>
       </c:catAx>
       <c:valAx>
-        <c:axId val="102097280"/>
+        <c:axId val="107593728"/>
         <c:scaling>
           <c:orientation val="minMax"/>
         </c:scaling>
@@ -866,7 +867,7 @@
         <c:numFmt formatCode="General" sourceLinked="1"/>
         <c:majorTickMark val="none"/>
         <c:tickLblPos val="nextTo"/>
-        <c:crossAx val="102079104"/>
+        <c:crossAx val="107587840"/>
         <c:crosses val="autoZero"/>
         <c:crossBetween val="between"/>
       </c:valAx>
@@ -1259,7 +1260,7 @@
                   <c:v>74</c:v>
                 </c:pt>
                 <c:pt idx="1">
-                  <c:v>38.800000000000011</c:v>
+                  <c:v>38.800000000000004</c:v>
                 </c:pt>
                 <c:pt idx="2">
                   <c:v>33.9</c:v>
@@ -1405,7 +1406,7 @@
                   <c:v>182.6</c:v>
                 </c:pt>
                 <c:pt idx="5">
-                  <c:v>282.89999999999992</c:v>
+                  <c:v>282.89999999999986</c:v>
                 </c:pt>
                 <c:pt idx="6">
                   <c:v>302.3</c:v>
@@ -1711,14 +1712,13 @@
             </c:ext>
           </c:extLst>
         </c:ser>
-        <c:dLbls/>
         <c:gapWidth val="219"/>
         <c:overlap val="-27"/>
-        <c:axId val="104790656"/>
-        <c:axId val="104345984"/>
+        <c:axId val="109902080"/>
+        <c:axId val="109715456"/>
       </c:barChart>
       <c:catAx>
-        <c:axId val="104790656"/>
+        <c:axId val="109902080"/>
         <c:scaling>
           <c:orientation val="minMax"/>
         </c:scaling>
@@ -1759,14 +1759,14 @@
             <a:endParaRPr lang="pt-PT"/>
           </a:p>
         </c:txPr>
-        <c:crossAx val="104345984"/>
+        <c:crossAx val="109715456"/>
         <c:crosses val="autoZero"/>
         <c:auto val="1"/>
         <c:lblAlgn val="ctr"/>
         <c:lblOffset val="100"/>
       </c:catAx>
       <c:valAx>
-        <c:axId val="104345984"/>
+        <c:axId val="109715456"/>
         <c:scaling>
           <c:orientation val="minMax"/>
         </c:scaling>
@@ -1815,7 +1815,7 @@
             <a:endParaRPr lang="pt-PT"/>
           </a:p>
         </c:txPr>
-        <c:crossAx val="104790656"/>
+        <c:crossAx val="109902080"/>
         <c:crosses val="autoZero"/>
         <c:crossBetween val="between"/>
       </c:valAx>
@@ -1892,6 +1892,7 @@
 
 <file path=ppt/charts/chart11.xml><?xml version="1.0" encoding="utf-8"?>
 <c:chartSpace xmlns:c="http://schemas.openxmlformats.org/drawingml/2006/chart" xmlns:a="http://schemas.openxmlformats.org/drawingml/2006/main" xmlns:r="http://schemas.openxmlformats.org/officeDocument/2006/relationships">
+  <c:date1904 val="1"/>
   <c:lang val="pt-PT"/>
   <c:chart>
     <c:title>
@@ -2303,7 +2304,7 @@
                   <c:v>94.57</c:v>
                 </c:pt>
                 <c:pt idx="6">
-                  <c:v>94.460000000000008</c:v>
+                  <c:v>94.460000000000022</c:v>
                 </c:pt>
                 <c:pt idx="7">
                   <c:v>87.38</c:v>
@@ -2324,7 +2325,7 @@
                   <c:v>96</c:v>
                 </c:pt>
                 <c:pt idx="13">
-                  <c:v>95.240000000000009</c:v>
+                  <c:v>95.240000000000023</c:v>
                 </c:pt>
                 <c:pt idx="14">
                   <c:v>95.61999999999999</c:v>
@@ -2430,10 +2431,10 @@
                   <c:v>46.97</c:v>
                 </c:pt>
                 <c:pt idx="1">
-                  <c:v>61.260000000000005</c:v>
+                  <c:v>61.260000000000012</c:v>
                 </c:pt>
                 <c:pt idx="2">
-                  <c:v>63.949999999999996</c:v>
+                  <c:v>63.95</c:v>
                 </c:pt>
                 <c:pt idx="3">
                   <c:v>62.17</c:v>
@@ -2614,14 +2615,13 @@
             </c:ext>
           </c:extLst>
         </c:ser>
-        <c:dLbls/>
         <c:gapWidth val="219"/>
         <c:overlap val="-27"/>
-        <c:axId val="104831616"/>
-        <c:axId val="104849792"/>
+        <c:axId val="109820160"/>
+        <c:axId val="110034944"/>
       </c:barChart>
       <c:catAx>
-        <c:axId val="104831616"/>
+        <c:axId val="109820160"/>
         <c:scaling>
           <c:orientation val="minMax"/>
         </c:scaling>
@@ -2662,14 +2662,14 @@
             <a:endParaRPr lang="pt-PT"/>
           </a:p>
         </c:txPr>
-        <c:crossAx val="104849792"/>
+        <c:crossAx val="110034944"/>
         <c:crosses val="autoZero"/>
         <c:auto val="1"/>
         <c:lblAlgn val="ctr"/>
         <c:lblOffset val="100"/>
       </c:catAx>
       <c:valAx>
-        <c:axId val="104849792"/>
+        <c:axId val="110034944"/>
         <c:scaling>
           <c:orientation val="minMax"/>
         </c:scaling>
@@ -2718,7 +2718,7 @@
             <a:endParaRPr lang="pt-PT"/>
           </a:p>
         </c:txPr>
-        <c:crossAx val="104831616"/>
+        <c:crossAx val="109820160"/>
         <c:crosses val="autoZero"/>
         <c:crossBetween val="between"/>
       </c:valAx>
@@ -2795,6 +2795,7 @@
 
 <file path=ppt/charts/chart12.xml><?xml version="1.0" encoding="utf-8"?>
 <c:chartSpace xmlns:c="http://schemas.openxmlformats.org/drawingml/2006/chart" xmlns:a="http://schemas.openxmlformats.org/drawingml/2006/main" xmlns:r="http://schemas.openxmlformats.org/officeDocument/2006/relationships">
+  <c:date1904 val="1"/>
   <c:lang val="pt-PT"/>
   <c:chart>
     <c:title>
@@ -3176,7 +3177,7 @@
                 <c:formatCode>General</c:formatCode>
                 <c:ptCount val="15"/>
                 <c:pt idx="0">
-                  <c:v>39.300000000000011</c:v>
+                  <c:v>39.300000000000004</c:v>
                 </c:pt>
                 <c:pt idx="1">
                   <c:v>82.6</c:v>
@@ -3203,7 +3204,7 @@
                   <c:v>98.7</c:v>
                 </c:pt>
                 <c:pt idx="9">
-                  <c:v>37.300000000000011</c:v>
+                  <c:v>37.300000000000004</c:v>
                 </c:pt>
                 <c:pt idx="10">
                   <c:v>99.3</c:v>
@@ -3229,10 +3230,9 @@
             </c:ext>
           </c:extLst>
         </c:ser>
-        <c:dLbls/>
         <c:marker val="1"/>
-        <c:axId val="105059072"/>
-        <c:axId val="105060608"/>
+        <c:axId val="110342528"/>
+        <c:axId val="110344064"/>
         <c:extLst xmlns:c16r2="http://schemas.microsoft.com/office/drawing/2015/06/chart">
           <c:ext xmlns:c15="http://schemas.microsoft.com/office/drawing/2012/chart" uri="{02D57815-91ED-43cb-92C2-25804820EDAC}">
             <c15:filteredLineSeries>
@@ -3599,7 +3599,7 @@
         </c:extLst>
       </c:lineChart>
       <c:catAx>
-        <c:axId val="105059072"/>
+        <c:axId val="110342528"/>
         <c:scaling>
           <c:orientation val="minMax"/>
         </c:scaling>
@@ -3639,14 +3639,14 @@
             <a:endParaRPr lang="pt-PT"/>
           </a:p>
         </c:txPr>
-        <c:crossAx val="105060608"/>
+        <c:crossAx val="110344064"/>
         <c:crosses val="autoZero"/>
         <c:auto val="1"/>
         <c:lblAlgn val="ctr"/>
         <c:lblOffset val="100"/>
       </c:catAx>
       <c:valAx>
-        <c:axId val="105060608"/>
+        <c:axId val="110344064"/>
         <c:scaling>
           <c:orientation val="minMax"/>
         </c:scaling>
@@ -3694,7 +3694,7 @@
             <a:endParaRPr lang="pt-PT"/>
           </a:p>
         </c:txPr>
-        <c:crossAx val="105059072"/>
+        <c:crossAx val="110342528"/>
         <c:crosses val="autoZero"/>
         <c:crossBetween val="between"/>
       </c:valAx>
@@ -3803,6 +3803,469 @@
 </file>
 
 <file path=ppt/charts/chart13.xml><?xml version="1.0" encoding="utf-8"?>
+<c:chartSpace xmlns:c="http://schemas.openxmlformats.org/drawingml/2006/chart" xmlns:a="http://schemas.openxmlformats.org/drawingml/2006/main" xmlns:r="http://schemas.openxmlformats.org/officeDocument/2006/relationships">
+  <c:date1904 val="1"/>
+  <c:lang val="pt-PT"/>
+  <c:chart>
+    <c:title>
+      <c:tx>
+        <c:rich>
+          <a:bodyPr rot="0" spcFirstLastPara="1" vertOverflow="ellipsis" vert="horz" wrap="square" anchor="ctr" anchorCtr="1"/>
+          <a:lstStyle/>
+          <a:p>
+            <a:pPr>
+              <a:defRPr sz="1600" b="1" i="0" u="none" strike="noStrike" kern="1200" cap="all" spc="120" normalizeH="0" baseline="0">
+                <a:solidFill>
+                  <a:schemeClr val="tx1">
+                    <a:lumMod val="65000"/>
+                    <a:lumOff val="35000"/>
+                  </a:schemeClr>
+                </a:solidFill>
+                <a:latin typeface="+mn-lt"/>
+                <a:ea typeface="+mn-ea"/>
+                <a:cs typeface="+mn-cs"/>
+              </a:defRPr>
+            </a:pPr>
+            <a:r>
+              <a:rPr lang="pt-PT"/>
+              <a:t>Comparação do Cmp ger.10</a:t>
+            </a:r>
+          </a:p>
+          <a:p>
+            <a:pPr>
+              <a:defRPr sz="1600" b="1" i="0" u="none" strike="noStrike" kern="1200" cap="all" spc="120" normalizeH="0" baseline="0">
+                <a:solidFill>
+                  <a:schemeClr val="tx1">
+                    <a:lumMod val="65000"/>
+                    <a:lumOff val="35000"/>
+                  </a:schemeClr>
+                </a:solidFill>
+                <a:latin typeface="+mn-lt"/>
+                <a:ea typeface="+mn-ea"/>
+                <a:cs typeface="+mn-cs"/>
+              </a:defRPr>
+            </a:pPr>
+            <a:r>
+              <a:rPr lang="pt-PT"/>
+              <a:t>com</a:t>
+            </a:r>
+            <a:r>
+              <a:rPr lang="pt-PT" baseline="0"/>
+              <a:t> outros algoritmos</a:t>
+            </a:r>
+            <a:endParaRPr lang="pt-PT"/>
+          </a:p>
+        </c:rich>
+      </c:tx>
+      <c:layout/>
+      <c:spPr>
+        <a:noFill/>
+        <a:ln>
+          <a:noFill/>
+        </a:ln>
+        <a:effectLst/>
+      </c:spPr>
+    </c:title>
+    <c:plotArea>
+      <c:layout/>
+      <c:barChart>
+        <c:barDir val="col"/>
+        <c:grouping val="clustered"/>
+        <c:ser>
+          <c:idx val="0"/>
+          <c:order val="0"/>
+          <c:tx>
+            <c:v>Média da Taxa de Compressão</c:v>
+          </c:tx>
+          <c:spPr>
+            <a:solidFill>
+              <a:schemeClr val="accent1"/>
+            </a:solidFill>
+            <a:ln>
+              <a:noFill/>
+            </a:ln>
+            <a:effectLst/>
+          </c:spPr>
+          <c:dLbls>
+            <c:spPr>
+              <a:noFill/>
+              <a:ln>
+                <a:noFill/>
+              </a:ln>
+              <a:effectLst/>
+            </c:spPr>
+            <c:txPr>
+              <a:bodyPr rot="-5400000" spcFirstLastPara="1" vertOverflow="clip" horzOverflow="clip" vert="horz" wrap="square" lIns="38100" tIns="19050" rIns="38100" bIns="19050" anchor="ctr" anchorCtr="1">
+                <a:spAutoFit/>
+              </a:bodyPr>
+              <a:lstStyle/>
+              <a:p>
+                <a:pPr>
+                  <a:defRPr sz="800" b="0" i="0" u="none" strike="noStrike" kern="1200" baseline="0">
+                    <a:solidFill>
+                      <a:schemeClr val="tx1">
+                        <a:lumMod val="50000"/>
+                        <a:lumOff val="50000"/>
+                      </a:schemeClr>
+                    </a:solidFill>
+                    <a:latin typeface="+mn-lt"/>
+                    <a:ea typeface="+mn-ea"/>
+                    <a:cs typeface="+mn-cs"/>
+                  </a:defRPr>
+                </a:pPr>
+                <a:endParaRPr lang="pt-PT"/>
+              </a:p>
+            </c:txPr>
+            <c:dLblPos val="outEnd"/>
+            <c:showVal val="1"/>
+            <c:extLst xmlns:c16r2="http://schemas.microsoft.com/office/drawing/2015/06/chart">
+              <c:ext xmlns:c15="http://schemas.microsoft.com/office/drawing/2012/chart" uri="{CE6537A1-D6FC-4f65-9D91-7224C49458BB}">
+                <c15:showLeaderLines val="1"/>
+                <c15:leaderLines>
+                  <c:spPr>
+                    <a:ln w="9525">
+                      <a:solidFill>
+                        <a:schemeClr val="tx1">
+                          <a:lumMod val="35000"/>
+                          <a:lumOff val="65000"/>
+                        </a:schemeClr>
+                      </a:solidFill>
+                    </a:ln>
+                    <a:effectLst/>
+                  </c:spPr>
+                </c15:leaderLines>
+              </c:ext>
+            </c:extLst>
+          </c:dLbls>
+          <c:cat>
+            <c:strLit>
+              <c:ptCount val="5"/>
+              <c:pt idx="0">
+                <c:v>Jpeg2000 Parte 1</c:v>
+              </c:pt>
+              <c:pt idx="1">
+                <c:v>Jpeg</c:v>
+              </c:pt>
+              <c:pt idx="2">
+                <c:v>Bzip2</c:v>
+              </c:pt>
+              <c:pt idx="3">
+                <c:v>Png</c:v>
+              </c:pt>
+              <c:pt idx="4">
+                <c:v>Cmp10</c:v>
+              </c:pt>
+            </c:strLit>
+          </c:cat>
+          <c:val>
+            <c:numRef>
+              <c:f>Folha1!$A$200:$E$200</c:f>
+              <c:numCache>
+                <c:formatCode>General</c:formatCode>
+                <c:ptCount val="5"/>
+                <c:pt idx="0">
+                  <c:v>78.260000000000005</c:v>
+                </c:pt>
+                <c:pt idx="1">
+                  <c:v>95.710000000000022</c:v>
+                </c:pt>
+                <c:pt idx="2">
+                  <c:v>75.940000000000026</c:v>
+                </c:pt>
+                <c:pt idx="3">
+                  <c:v>76.48</c:v>
+                </c:pt>
+                <c:pt idx="4">
+                  <c:v>76.400000000000006</c:v>
+                </c:pt>
+              </c:numCache>
+            </c:numRef>
+          </c:val>
+          <c:extLst xmlns:c16r2="http://schemas.microsoft.com/office/drawing/2015/06/chart">
+            <c:ext xmlns:c16="http://schemas.microsoft.com/office/drawing/2014/chart" uri="{C3380CC4-5D6E-409C-BE32-E72D297353CC}">
+              <c16:uniqueId val="{00000000-6112-4BA9-A4EE-147C138900ED}"/>
+            </c:ext>
+          </c:extLst>
+        </c:ser>
+        <c:ser>
+          <c:idx val="1"/>
+          <c:order val="1"/>
+          <c:tx>
+            <c:v>Média do Tempo Total</c:v>
+          </c:tx>
+          <c:spPr>
+            <a:solidFill>
+              <a:schemeClr val="accent2"/>
+            </a:solidFill>
+            <a:ln>
+              <a:noFill/>
+            </a:ln>
+            <a:effectLst/>
+          </c:spPr>
+          <c:dLbls>
+            <c:spPr>
+              <a:noFill/>
+              <a:ln>
+                <a:noFill/>
+              </a:ln>
+              <a:effectLst/>
+            </c:spPr>
+            <c:txPr>
+              <a:bodyPr rot="-5400000" spcFirstLastPara="1" vertOverflow="clip" horzOverflow="clip" vert="horz" wrap="square" lIns="38100" tIns="19050" rIns="38100" bIns="19050" anchor="ctr" anchorCtr="1">
+                <a:spAutoFit/>
+              </a:bodyPr>
+              <a:lstStyle/>
+              <a:p>
+                <a:pPr>
+                  <a:defRPr sz="800" b="0" i="0" u="none" strike="noStrike" kern="1200" baseline="0">
+                    <a:solidFill>
+                      <a:schemeClr val="tx1">
+                        <a:lumMod val="50000"/>
+                        <a:lumOff val="50000"/>
+                      </a:schemeClr>
+                    </a:solidFill>
+                    <a:latin typeface="+mn-lt"/>
+                    <a:ea typeface="+mn-ea"/>
+                    <a:cs typeface="+mn-cs"/>
+                  </a:defRPr>
+                </a:pPr>
+                <a:endParaRPr lang="pt-PT"/>
+              </a:p>
+            </c:txPr>
+            <c:dLblPos val="outEnd"/>
+            <c:showVal val="1"/>
+            <c:extLst xmlns:c16r2="http://schemas.microsoft.com/office/drawing/2015/06/chart">
+              <c:ext xmlns:c15="http://schemas.microsoft.com/office/drawing/2012/chart" uri="{CE6537A1-D6FC-4f65-9D91-7224C49458BB}">
+                <c15:showLeaderLines val="1"/>
+                <c15:leaderLines>
+                  <c:spPr>
+                    <a:ln w="9525">
+                      <a:solidFill>
+                        <a:schemeClr val="tx1">
+                          <a:lumMod val="35000"/>
+                          <a:lumOff val="65000"/>
+                        </a:schemeClr>
+                      </a:solidFill>
+                    </a:ln>
+                    <a:effectLst/>
+                  </c:spPr>
+                </c15:leaderLines>
+              </c:ext>
+            </c:extLst>
+          </c:dLbls>
+          <c:cat>
+            <c:strLit>
+              <c:ptCount val="5"/>
+              <c:pt idx="0">
+                <c:v>Jpeg2000 Parte 1</c:v>
+              </c:pt>
+              <c:pt idx="1">
+                <c:v>Jpeg</c:v>
+              </c:pt>
+              <c:pt idx="2">
+                <c:v>Bzip2</c:v>
+              </c:pt>
+              <c:pt idx="3">
+                <c:v>Png</c:v>
+              </c:pt>
+              <c:pt idx="4">
+                <c:v>Cmp10</c:v>
+              </c:pt>
+            </c:strLit>
+          </c:cat>
+          <c:val>
+            <c:numRef>
+              <c:f>Folha1!$A$201:$E$201</c:f>
+              <c:numCache>
+                <c:formatCode>General</c:formatCode>
+                <c:ptCount val="5"/>
+                <c:pt idx="0">
+                  <c:v>10.91</c:v>
+                </c:pt>
+                <c:pt idx="1">
+                  <c:v>0.54</c:v>
+                </c:pt>
+                <c:pt idx="2">
+                  <c:v>1.87</c:v>
+                </c:pt>
+                <c:pt idx="3">
+                  <c:v>0</c:v>
+                </c:pt>
+                <c:pt idx="4">
+                  <c:v>18.600000000000001</c:v>
+                </c:pt>
+              </c:numCache>
+            </c:numRef>
+          </c:val>
+          <c:extLst xmlns:c16r2="http://schemas.microsoft.com/office/drawing/2015/06/chart">
+            <c:ext xmlns:c16="http://schemas.microsoft.com/office/drawing/2014/chart" uri="{C3380CC4-5D6E-409C-BE32-E72D297353CC}">
+              <c16:uniqueId val="{00000001-6112-4BA9-A4EE-147C138900ED}"/>
+            </c:ext>
+          </c:extLst>
+        </c:ser>
+        <c:dLbls>
+          <c:showVal val="1"/>
+        </c:dLbls>
+        <c:gapWidth val="444"/>
+        <c:overlap val="-90"/>
+        <c:axId val="150309888"/>
+        <c:axId val="150341888"/>
+      </c:barChart>
+      <c:catAx>
+        <c:axId val="150309888"/>
+        <c:scaling>
+          <c:orientation val="minMax"/>
+        </c:scaling>
+        <c:axPos val="b"/>
+        <c:majorGridlines>
+          <c:spPr>
+            <a:ln w="9525" cap="flat" cmpd="sng" algn="ctr">
+              <a:solidFill>
+                <a:schemeClr val="tx1">
+                  <a:lumMod val="15000"/>
+                  <a:lumOff val="85000"/>
+                </a:schemeClr>
+              </a:solidFill>
+              <a:round/>
+            </a:ln>
+            <a:effectLst/>
+          </c:spPr>
+        </c:majorGridlines>
+        <c:numFmt formatCode="General" sourceLinked="1"/>
+        <c:majorTickMark val="none"/>
+        <c:tickLblPos val="nextTo"/>
+        <c:spPr>
+          <a:noFill/>
+          <a:ln w="9525" cap="flat" cmpd="sng" algn="ctr">
+            <a:solidFill>
+              <a:schemeClr val="tx1">
+                <a:lumMod val="15000"/>
+                <a:lumOff val="85000"/>
+              </a:schemeClr>
+            </a:solidFill>
+            <a:round/>
+          </a:ln>
+          <a:effectLst/>
+        </c:spPr>
+        <c:txPr>
+          <a:bodyPr rot="-60000000" spcFirstLastPara="1" vertOverflow="ellipsis" vert="horz" wrap="square" anchor="ctr" anchorCtr="1"/>
+          <a:lstStyle/>
+          <a:p>
+            <a:pPr>
+              <a:defRPr sz="800" b="0" i="0" u="none" strike="noStrike" kern="1200" cap="all" spc="120" normalizeH="0" baseline="0">
+                <a:solidFill>
+                  <a:schemeClr val="tx1">
+                    <a:lumMod val="65000"/>
+                    <a:lumOff val="35000"/>
+                  </a:schemeClr>
+                </a:solidFill>
+                <a:latin typeface="+mn-lt"/>
+                <a:ea typeface="+mn-ea"/>
+                <a:cs typeface="+mn-cs"/>
+              </a:defRPr>
+            </a:pPr>
+            <a:endParaRPr lang="pt-PT"/>
+          </a:p>
+        </c:txPr>
+        <c:crossAx val="150341888"/>
+        <c:crosses val="autoZero"/>
+        <c:auto val="1"/>
+        <c:lblAlgn val="ctr"/>
+        <c:lblOffset val="100"/>
+      </c:catAx>
+      <c:valAx>
+        <c:axId val="150341888"/>
+        <c:scaling>
+          <c:orientation val="minMax"/>
+        </c:scaling>
+        <c:delete val="1"/>
+        <c:axPos val="l"/>
+        <c:numFmt formatCode="General" sourceLinked="1"/>
+        <c:majorTickMark val="none"/>
+        <c:tickLblPos val="nextTo"/>
+        <c:crossAx val="150309888"/>
+        <c:crosses val="autoZero"/>
+        <c:crossBetween val="between"/>
+      </c:valAx>
+      <c:dTable>
+        <c:showHorzBorder val="1"/>
+        <c:showVertBorder val="1"/>
+        <c:showOutline val="1"/>
+        <c:showKeys val="1"/>
+        <c:spPr>
+          <a:noFill/>
+          <a:ln w="9525">
+            <a:solidFill>
+              <a:schemeClr val="tx1">
+                <a:lumMod val="15000"/>
+                <a:lumOff val="85000"/>
+              </a:schemeClr>
+            </a:solidFill>
+          </a:ln>
+          <a:effectLst/>
+        </c:spPr>
+        <c:txPr>
+          <a:bodyPr rot="0" spcFirstLastPara="1" vertOverflow="ellipsis" vert="horz" wrap="square" anchor="ctr" anchorCtr="1"/>
+          <a:lstStyle/>
+          <a:p>
+            <a:pPr rtl="0">
+              <a:defRPr sz="900" b="0" i="0" u="none" strike="noStrike" kern="1200" baseline="0">
+                <a:solidFill>
+                  <a:schemeClr val="tx1">
+                    <a:lumMod val="65000"/>
+                    <a:lumOff val="35000"/>
+                  </a:schemeClr>
+                </a:solidFill>
+                <a:latin typeface="+mn-lt"/>
+                <a:ea typeface="+mn-ea"/>
+                <a:cs typeface="+mn-cs"/>
+              </a:defRPr>
+            </a:pPr>
+            <a:endParaRPr lang="pt-PT"/>
+          </a:p>
+        </c:txPr>
+      </c:dTable>
+      <c:spPr>
+        <a:noFill/>
+        <a:ln>
+          <a:noFill/>
+        </a:ln>
+        <a:effectLst/>
+      </c:spPr>
+    </c:plotArea>
+    <c:plotVisOnly val="1"/>
+    <c:dispBlanksAs val="gap"/>
+  </c:chart>
+  <c:spPr>
+    <a:solidFill>
+      <a:schemeClr val="lt1"/>
+    </a:solidFill>
+    <a:ln w="9525" cap="flat" cmpd="sng" algn="ctr">
+      <a:solidFill>
+        <a:schemeClr val="tx1">
+          <a:lumMod val="15000"/>
+          <a:lumOff val="85000"/>
+        </a:schemeClr>
+      </a:solidFill>
+      <a:round/>
+    </a:ln>
+    <a:effectLst/>
+  </c:spPr>
+  <c:txPr>
+    <a:bodyPr/>
+    <a:lstStyle/>
+    <a:p>
+      <a:pPr>
+        <a:defRPr/>
+      </a:pPr>
+      <a:endParaRPr lang="pt-PT"/>
+    </a:p>
+  </c:txPr>
+  <c:externalData r:id="rId1"/>
+</c:chartSpace>
+</file>
+
+<file path=ppt/charts/chart14.xml><?xml version="1.0" encoding="utf-8"?>
 <c:chartSpace xmlns:c="http://schemas.openxmlformats.org/drawingml/2006/chart" xmlns:a="http://schemas.openxmlformats.org/drawingml/2006/main" xmlns:r="http://schemas.openxmlformats.org/officeDocument/2006/relationships">
   <c:lang val="pt-PT"/>
   <c:chart>
@@ -4000,11 +4463,11 @@
         </c:dLbls>
         <c:gapWidth val="227"/>
         <c:overlap val="-48"/>
-        <c:axId val="104927232"/>
-        <c:axId val="104928768"/>
+        <c:axId val="110361984"/>
+        <c:axId val="110392448"/>
       </c:barChart>
       <c:catAx>
-        <c:axId val="104927232"/>
+        <c:axId val="110361984"/>
         <c:scaling>
           <c:orientation val="minMax"/>
         </c:scaling>
@@ -4045,14 +4508,14 @@
             <a:endParaRPr lang="pt-PT"/>
           </a:p>
         </c:txPr>
-        <c:crossAx val="104928768"/>
+        <c:crossAx val="110392448"/>
         <c:crosses val="autoZero"/>
         <c:auto val="1"/>
         <c:lblAlgn val="ctr"/>
         <c:lblOffset val="100"/>
       </c:catAx>
       <c:valAx>
-        <c:axId val="104928768"/>
+        <c:axId val="110392448"/>
         <c:scaling>
           <c:orientation val="minMax"/>
         </c:scaling>
@@ -4087,7 +4550,7 @@
             <a:endParaRPr lang="pt-PT"/>
           </a:p>
         </c:txPr>
-        <c:crossAx val="104927232"/>
+        <c:crossAx val="110361984"/>
         <c:crosses val="autoZero"/>
         <c:crossBetween val="between"/>
       </c:valAx>
@@ -4123,8 +4586,9 @@
 </c:chartSpace>
 </file>
 
-<file path=ppt/charts/chart14.xml><?xml version="1.0" encoding="utf-8"?>
+<file path=ppt/charts/chart15.xml><?xml version="1.0" encoding="utf-8"?>
 <c:chartSpace xmlns:c="http://schemas.openxmlformats.org/drawingml/2006/chart" xmlns:a="http://schemas.openxmlformats.org/drawingml/2006/main" xmlns:r="http://schemas.openxmlformats.org/officeDocument/2006/relationships">
+  <c:date1904 val="1"/>
   <c:lang val="pt-PT"/>
   <c:chart>
     <c:title>
@@ -4326,11 +4790,11 @@
         </c:dLbls>
         <c:gapWidth val="227"/>
         <c:overlap val="-48"/>
-        <c:axId val="104957440"/>
-        <c:axId val="104958976"/>
+        <c:axId val="110437504"/>
+        <c:axId val="110439040"/>
       </c:barChart>
       <c:catAx>
-        <c:axId val="104957440"/>
+        <c:axId val="110437504"/>
         <c:scaling>
           <c:orientation val="minMax"/>
         </c:scaling>
@@ -4371,14 +4835,14 @@
             <a:endParaRPr lang="pt-PT"/>
           </a:p>
         </c:txPr>
-        <c:crossAx val="104958976"/>
+        <c:crossAx val="110439040"/>
         <c:crosses val="autoZero"/>
         <c:auto val="1"/>
         <c:lblAlgn val="ctr"/>
         <c:lblOffset val="100"/>
       </c:catAx>
       <c:valAx>
-        <c:axId val="104958976"/>
+        <c:axId val="110439040"/>
         <c:scaling>
           <c:orientation val="minMax"/>
         </c:scaling>
@@ -4413,7 +4877,7 @@
             <a:endParaRPr lang="pt-PT"/>
           </a:p>
         </c:txPr>
-        <c:crossAx val="104957440"/>
+        <c:crossAx val="110437504"/>
         <c:crosses val="autoZero"/>
         <c:crossBetween val="between"/>
       </c:valAx>
@@ -4449,7 +4913,7 @@
 </c:chartSpace>
 </file>
 
-<file path=ppt/charts/chart15.xml><?xml version="1.0" encoding="utf-8"?>
+<file path=ppt/charts/chart16.xml><?xml version="1.0" encoding="utf-8"?>
 <c:chartSpace xmlns:c="http://schemas.openxmlformats.org/drawingml/2006/chart" xmlns:a="http://schemas.openxmlformats.org/drawingml/2006/main" xmlns:r="http://schemas.openxmlformats.org/officeDocument/2006/relationships">
   <c:lang val="pt-PT"/>
   <c:chart>
@@ -4642,11 +5106,11 @@
         </c:dLbls>
         <c:gapWidth val="227"/>
         <c:overlap val="-48"/>
-        <c:axId val="105327616"/>
-        <c:axId val="105337600"/>
+        <c:axId val="110480000"/>
+        <c:axId val="110756224"/>
       </c:barChart>
       <c:catAx>
-        <c:axId val="105327616"/>
+        <c:axId val="110480000"/>
         <c:scaling>
           <c:orientation val="minMax"/>
         </c:scaling>
@@ -4687,14 +5151,14 @@
             <a:endParaRPr lang="pt-PT"/>
           </a:p>
         </c:txPr>
-        <c:crossAx val="105337600"/>
+        <c:crossAx val="110756224"/>
         <c:crosses val="autoZero"/>
         <c:auto val="1"/>
         <c:lblAlgn val="ctr"/>
         <c:lblOffset val="100"/>
       </c:catAx>
       <c:valAx>
-        <c:axId val="105337600"/>
+        <c:axId val="110756224"/>
         <c:scaling>
           <c:orientation val="minMax"/>
         </c:scaling>
@@ -4729,7 +5193,7 @@
             <a:endParaRPr lang="pt-PT"/>
           </a:p>
         </c:txPr>
-        <c:crossAx val="105327616"/>
+        <c:crossAx val="110480000"/>
         <c:crosses val="autoZero"/>
         <c:crossBetween val="between"/>
       </c:valAx>
@@ -4767,6 +5231,7 @@
 
 <file path=ppt/charts/chart2.xml><?xml version="1.0" encoding="utf-8"?>
 <c:chartSpace xmlns:c="http://schemas.openxmlformats.org/drawingml/2006/chart" xmlns:a="http://schemas.openxmlformats.org/drawingml/2006/main" xmlns:r="http://schemas.openxmlformats.org/officeDocument/2006/relationships">
+  <c:date1904 val="1"/>
   <c:lang val="pt-PT"/>
   <c:chart>
     <c:title>
@@ -5045,10 +5510,10 @@
                   <c:v>3.54</c:v>
                 </c:pt>
                 <c:pt idx="1">
-                  <c:v>0.15000000000000002</c:v>
+                  <c:v>0.15000000000000005</c:v>
                 </c:pt>
                 <c:pt idx="2">
-                  <c:v>0.97000000000000008</c:v>
+                  <c:v>0.9700000000000002</c:v>
                 </c:pt>
                 <c:pt idx="3">
                   <c:v>0</c:v>
@@ -5378,10 +5843,10 @@
                 <c:formatCode>General</c:formatCode>
                 <c:ptCount val="5"/>
                 <c:pt idx="0">
-                  <c:v>5.9700000000000006</c:v>
+                  <c:v>5.9700000000000015</c:v>
                 </c:pt>
                 <c:pt idx="1">
-                  <c:v>0.31000000000000005</c:v>
+                  <c:v>0.31000000000000011</c:v>
                 </c:pt>
                 <c:pt idx="2">
                   <c:v>1.1100000000000001</c:v>
@@ -5406,11 +5871,11 @@
         </c:dLbls>
         <c:gapWidth val="444"/>
         <c:overlap val="-90"/>
-        <c:axId val="102658048"/>
-        <c:axId val="102659584"/>
+        <c:axId val="108072320"/>
+        <c:axId val="108094592"/>
       </c:barChart>
       <c:catAx>
-        <c:axId val="102658048"/>
+        <c:axId val="108072320"/>
         <c:scaling>
           <c:orientation val="minMax"/>
         </c:scaling>
@@ -5465,14 +5930,14 @@
             <a:endParaRPr lang="pt-PT"/>
           </a:p>
         </c:txPr>
-        <c:crossAx val="102659584"/>
+        <c:crossAx val="108094592"/>
         <c:crosses val="autoZero"/>
         <c:auto val="1"/>
         <c:lblAlgn val="ctr"/>
         <c:lblOffset val="100"/>
       </c:catAx>
       <c:valAx>
-        <c:axId val="102659584"/>
+        <c:axId val="108094592"/>
         <c:scaling>
           <c:orientation val="minMax"/>
         </c:scaling>
@@ -5481,7 +5946,7 @@
         <c:numFmt formatCode="General" sourceLinked="1"/>
         <c:majorTickMark val="none"/>
         <c:tickLblPos val="nextTo"/>
-        <c:crossAx val="102658048"/>
+        <c:crossAx val="108072320"/>
         <c:crosses val="autoZero"/>
         <c:crossBetween val="between"/>
       </c:valAx>
@@ -5734,7 +6199,7 @@
                   <c:v>0</c:v>
                 </c:pt>
                 <c:pt idx="4">
-                  <c:v>0.75000000000000011</c:v>
+                  <c:v>0.75000000000000022</c:v>
                 </c:pt>
               </c:numCache>
             </c:numRef>
@@ -5849,19 +6314,19 @@
                 <c:formatCode>General</c:formatCode>
                 <c:ptCount val="5"/>
                 <c:pt idx="0">
-                  <c:v>2.8299999999999996</c:v>
+                  <c:v>2.8299999999999992</c:v>
                 </c:pt>
                 <c:pt idx="1">
-                  <c:v>0.12000000000000001</c:v>
+                  <c:v>0.12000000000000002</c:v>
                 </c:pt>
                 <c:pt idx="2">
-                  <c:v>0.6100000000000001</c:v>
+                  <c:v>0.61000000000000021</c:v>
                 </c:pt>
                 <c:pt idx="3">
                   <c:v>0</c:v>
                 </c:pt>
                 <c:pt idx="4">
-                  <c:v>0.41000000000000003</c:v>
+                  <c:v>0.41000000000000009</c:v>
                 </c:pt>
               </c:numCache>
             </c:numRef>
@@ -5979,7 +6444,7 @@
                   <c:v>8.59</c:v>
                 </c:pt>
                 <c:pt idx="1">
-                  <c:v>0.42000000000000004</c:v>
+                  <c:v>0.4200000000000001</c:v>
                 </c:pt>
                 <c:pt idx="2">
                   <c:v>0.68</c:v>
@@ -5988,7 +6453,7 @@
                   <c:v>0</c:v>
                 </c:pt>
                 <c:pt idx="4">
-                  <c:v>0.8600000000000001</c:v>
+                  <c:v>0.86000000000000021</c:v>
                 </c:pt>
               </c:numCache>
             </c:numRef>
@@ -6109,13 +6574,13 @@
                   <c:v>0.19</c:v>
                 </c:pt>
                 <c:pt idx="2">
-                  <c:v>0.8600000000000001</c:v>
+                  <c:v>0.86000000000000021</c:v>
                 </c:pt>
                 <c:pt idx="3">
                   <c:v>0</c:v>
                 </c:pt>
                 <c:pt idx="4">
-                  <c:v>0.95000000000000007</c:v>
+                  <c:v>0.95000000000000018</c:v>
                 </c:pt>
               </c:numCache>
             </c:numRef>
@@ -6213,13 +6678,13 @@
                   <c:v>0.23</c:v>
                 </c:pt>
                 <c:pt idx="2">
-                  <c:v>0.76000000000000012</c:v>
+                  <c:v>0.76000000000000023</c:v>
                 </c:pt>
                 <c:pt idx="3">
                   <c:v>0</c:v>
                 </c:pt>
                 <c:pt idx="4">
-                  <c:v>0.7400000000000001</c:v>
+                  <c:v>0.74000000000000021</c:v>
                 </c:pt>
               </c:numCache>
             </c:numRef>
@@ -6235,11 +6700,11 @@
         </c:dLbls>
         <c:gapWidth val="444"/>
         <c:overlap val="-90"/>
-        <c:axId val="103990016"/>
-        <c:axId val="103991552"/>
+        <c:axId val="109302144"/>
+        <c:axId val="109303680"/>
       </c:barChart>
       <c:catAx>
-        <c:axId val="103990016"/>
+        <c:axId val="109302144"/>
         <c:scaling>
           <c:orientation val="minMax"/>
         </c:scaling>
@@ -6294,14 +6759,14 @@
             <a:endParaRPr lang="pt-PT"/>
           </a:p>
         </c:txPr>
-        <c:crossAx val="103991552"/>
+        <c:crossAx val="109303680"/>
         <c:crosses val="autoZero"/>
         <c:auto val="1"/>
         <c:lblAlgn val="ctr"/>
         <c:lblOffset val="100"/>
       </c:catAx>
       <c:valAx>
-        <c:axId val="103991552"/>
+        <c:axId val="109303680"/>
         <c:scaling>
           <c:orientation val="minMax"/>
         </c:scaling>
@@ -6310,7 +6775,7 @@
         <c:numFmt formatCode="General" sourceLinked="1"/>
         <c:majorTickMark val="none"/>
         <c:tickLblPos val="nextTo"/>
-        <c:crossAx val="103990016"/>
+        <c:crossAx val="109302144"/>
         <c:crosses val="autoZero"/>
         <c:crossBetween val="between"/>
       </c:valAx>
@@ -6805,7 +7270,7 @@
                 <c:formatCode>General</c:formatCode>
                 <c:ptCount val="5"/>
                 <c:pt idx="0">
-                  <c:v>18.509999999999994</c:v>
+                  <c:v>18.509999999999991</c:v>
                 </c:pt>
                 <c:pt idx="1">
                   <c:v>1</c:v>
@@ -7064,11 +7529,11 @@
         </c:dLbls>
         <c:gapWidth val="444"/>
         <c:overlap val="-90"/>
-        <c:axId val="104113280"/>
-        <c:axId val="104114816"/>
+        <c:axId val="109327104"/>
+        <c:axId val="109328640"/>
       </c:barChart>
       <c:catAx>
-        <c:axId val="104113280"/>
+        <c:axId val="109327104"/>
         <c:scaling>
           <c:orientation val="minMax"/>
         </c:scaling>
@@ -7123,14 +7588,14 @@
             <a:endParaRPr lang="pt-PT"/>
           </a:p>
         </c:txPr>
-        <c:crossAx val="104114816"/>
+        <c:crossAx val="109328640"/>
         <c:crosses val="autoZero"/>
         <c:auto val="1"/>
         <c:lblAlgn val="ctr"/>
         <c:lblOffset val="100"/>
       </c:catAx>
       <c:valAx>
-        <c:axId val="104114816"/>
+        <c:axId val="109328640"/>
         <c:scaling>
           <c:orientation val="minMax"/>
         </c:scaling>
@@ -7139,7 +7604,7 @@
         <c:numFmt formatCode="General" sourceLinked="1"/>
         <c:majorTickMark val="none"/>
         <c:tickLblPos val="nextTo"/>
-        <c:crossAx val="104113280"/>
+        <c:crossAx val="109327104"/>
         <c:crosses val="autoZero"/>
         <c:crossBetween val="between"/>
       </c:valAx>
@@ -7389,7 +7854,7 @@
                   <c:v>73.25</c:v>
                 </c:pt>
                 <c:pt idx="3">
-                  <c:v>73.910000000000011</c:v>
+                  <c:v>73.910000000000025</c:v>
                 </c:pt>
                 <c:pt idx="4">
                   <c:v>76.510000000000005</c:v>
@@ -7637,10 +8102,10 @@
                   <c:v>94.2</c:v>
                 </c:pt>
                 <c:pt idx="1">
-                  <c:v>97.679999999999993</c:v>
+                  <c:v>97.679999999999978</c:v>
                 </c:pt>
                 <c:pt idx="2">
-                  <c:v>96.240000000000009</c:v>
+                  <c:v>96.240000000000023</c:v>
                 </c:pt>
                 <c:pt idx="3">
                   <c:v>95.25</c:v>
@@ -7860,10 +8325,10 @@
                   <c:v>78.260000000000005</c:v>
                 </c:pt>
                 <c:pt idx="1">
-                  <c:v>95.710000000000008</c:v>
+                  <c:v>95.710000000000022</c:v>
                 </c:pt>
                 <c:pt idx="2">
-                  <c:v>75.940000000000012</c:v>
+                  <c:v>75.940000000000026</c:v>
                 </c:pt>
                 <c:pt idx="3">
                   <c:v>76.48</c:v>
@@ -7885,11 +8350,11 @@
         </c:dLbls>
         <c:gapWidth val="444"/>
         <c:overlap val="-90"/>
-        <c:axId val="104175872"/>
-        <c:axId val="104181760"/>
+        <c:axId val="109447040"/>
+        <c:axId val="109448576"/>
       </c:barChart>
       <c:catAx>
-        <c:axId val="104175872"/>
+        <c:axId val="109447040"/>
         <c:scaling>
           <c:orientation val="minMax"/>
         </c:scaling>
@@ -7944,14 +8409,14 @@
             <a:endParaRPr lang="pt-PT"/>
           </a:p>
         </c:txPr>
-        <c:crossAx val="104181760"/>
+        <c:crossAx val="109448576"/>
         <c:crosses val="autoZero"/>
         <c:auto val="1"/>
         <c:lblAlgn val="ctr"/>
         <c:lblOffset val="100"/>
       </c:catAx>
       <c:valAx>
-        <c:axId val="104181760"/>
+        <c:axId val="109448576"/>
         <c:scaling>
           <c:orientation val="minMax"/>
         </c:scaling>
@@ -7960,7 +8425,7 @@
         <c:numFmt formatCode="General" sourceLinked="1"/>
         <c:majorTickMark val="none"/>
         <c:tickLblPos val="nextTo"/>
-        <c:crossAx val="104175872"/>
+        <c:crossAx val="109447040"/>
         <c:crosses val="autoZero"/>
         <c:crossBetween val="between"/>
       </c:valAx>
@@ -8190,7 +8655,7 @@
                 <c:formatCode>General</c:formatCode>
                 <c:ptCount val="5"/>
                 <c:pt idx="0">
-                  <c:v>5.7241999999999988</c:v>
+                  <c:v>5.724199999999998</c:v>
                 </c:pt>
                 <c:pt idx="1">
                   <c:v>2.7505999999999999</c:v>
@@ -8422,16 +8887,16 @@
                 <c:formatCode>General</c:formatCode>
                 <c:ptCount val="5"/>
                 <c:pt idx="0">
-                  <c:v>1.8291999999999997</c:v>
+                  <c:v>1.8291999999999995</c:v>
                 </c:pt>
                 <c:pt idx="1">
-                  <c:v>0.61910000000000009</c:v>
+                  <c:v>0.61910000000000021</c:v>
                 </c:pt>
                 <c:pt idx="2">
                   <c:v>0.5645</c:v>
                 </c:pt>
                 <c:pt idx="3">
-                  <c:v>0.61770000000000014</c:v>
+                  <c:v>0.61770000000000025</c:v>
                 </c:pt>
                 <c:pt idx="4">
                   <c:v>0.59570000000000001</c:v>
@@ -8634,7 +9099,7 @@
                 <c:formatCode>General</c:formatCode>
                 <c:ptCount val="5"/>
                 <c:pt idx="0">
-                  <c:v>5.2013000000000007</c:v>
+                  <c:v>5.2013000000000016</c:v>
                 </c:pt>
                 <c:pt idx="1">
                   <c:v>2.3289</c:v>
@@ -8646,7 +9111,7 @@
                   <c:v>2.9579999999999997</c:v>
                 </c:pt>
                 <c:pt idx="4">
-                  <c:v>2.3352999999999997</c:v>
+                  <c:v>2.3352999999999993</c:v>
                 </c:pt>
               </c:numCache>
             </c:numRef>
@@ -8662,11 +9127,11 @@
         </c:dLbls>
         <c:gapWidth val="444"/>
         <c:overlap val="-90"/>
-        <c:axId val="104238080"/>
-        <c:axId val="104260352"/>
+        <c:axId val="109595264"/>
+        <c:axId val="109617536"/>
       </c:barChart>
       <c:catAx>
-        <c:axId val="104238080"/>
+        <c:axId val="109595264"/>
         <c:scaling>
           <c:orientation val="minMax"/>
         </c:scaling>
@@ -8721,14 +9186,14 @@
             <a:endParaRPr lang="pt-PT"/>
           </a:p>
         </c:txPr>
-        <c:crossAx val="104260352"/>
+        <c:crossAx val="109617536"/>
         <c:crosses val="autoZero"/>
         <c:auto val="1"/>
         <c:lblAlgn val="ctr"/>
         <c:lblOffset val="100"/>
       </c:catAx>
       <c:valAx>
-        <c:axId val="104260352"/>
+        <c:axId val="109617536"/>
         <c:scaling>
           <c:orientation val="minMax"/>
         </c:scaling>
@@ -8737,7 +9202,7 @@
         <c:numFmt formatCode="General" sourceLinked="1"/>
         <c:majorTickMark val="none"/>
         <c:tickLblPos val="nextTo"/>
-        <c:crossAx val="104238080"/>
+        <c:crossAx val="109595264"/>
         <c:crosses val="autoZero"/>
         <c:crossBetween val="between"/>
       </c:valAx>
@@ -8962,7 +9427,7 @@
                 <c:formatCode>General</c:formatCode>
                 <c:ptCount val="16"/>
                 <c:pt idx="0">
-                  <c:v>6.8599999999999994</c:v>
+                  <c:v>6.8599999999999985</c:v>
                 </c:pt>
                 <c:pt idx="1">
                   <c:v>5.49</c:v>
@@ -9111,7 +9576,7 @@
                   <c:v>3.4</c:v>
                 </c:pt>
                 <c:pt idx="5">
-                  <c:v>3.3299999999999996</c:v>
+                  <c:v>3.3299999999999992</c:v>
                 </c:pt>
                 <c:pt idx="6">
                   <c:v>3.34</c:v>
@@ -9397,7 +9862,7 @@
                   <c:v>5.55</c:v>
                 </c:pt>
                 <c:pt idx="11">
-                  <c:v>5.4700000000000006</c:v>
+                  <c:v>5.4700000000000015</c:v>
                 </c:pt>
                 <c:pt idx="12">
                   <c:v>5.29</c:v>
@@ -9551,14 +10016,13 @@
             </c:ext>
           </c:extLst>
         </c:ser>
-        <c:dLbls/>
         <c:gapWidth val="219"/>
         <c:overlap val="-27"/>
-        <c:axId val="104286848"/>
-        <c:axId val="104300928"/>
+        <c:axId val="109566208"/>
+        <c:axId val="106827776"/>
       </c:barChart>
       <c:catAx>
-        <c:axId val="104286848"/>
+        <c:axId val="109566208"/>
         <c:scaling>
           <c:orientation val="minMax"/>
         </c:scaling>
@@ -9599,14 +10063,14 @@
             <a:endParaRPr lang="pt-PT"/>
           </a:p>
         </c:txPr>
-        <c:crossAx val="104300928"/>
+        <c:crossAx val="106827776"/>
         <c:crosses val="autoZero"/>
         <c:auto val="1"/>
         <c:lblAlgn val="ctr"/>
         <c:lblOffset val="100"/>
       </c:catAx>
       <c:valAx>
-        <c:axId val="104300928"/>
+        <c:axId val="106827776"/>
         <c:scaling>
           <c:orientation val="minMax"/>
         </c:scaling>
@@ -9655,7 +10119,7 @@
             <a:endParaRPr lang="pt-PT"/>
           </a:p>
         </c:txPr>
-        <c:crossAx val="104286848"/>
+        <c:crossAx val="109566208"/>
         <c:crosses val="autoZero"/>
         <c:crossBetween val="between"/>
       </c:valAx>
@@ -9923,7 +10387,7 @@
                   <c:v>23.57</c:v>
                 </c:pt>
                 <c:pt idx="14">
-                  <c:v>41.809999999999995</c:v>
+                  <c:v>41.81</c:v>
                 </c:pt>
                 <c:pt idx="15">
                   <c:v>28.9</c:v>
@@ -10015,7 +10479,7 @@
                 <c:formatCode>General</c:formatCode>
                 <c:ptCount val="16"/>
                 <c:pt idx="0">
-                  <c:v>29.650000000000002</c:v>
+                  <c:v>29.650000000000006</c:v>
                 </c:pt>
                 <c:pt idx="1">
                   <c:v>16.010000000000005</c:v>
@@ -10045,7 +10509,7 @@
                   <c:v>7.75</c:v>
                 </c:pt>
                 <c:pt idx="10">
-                  <c:v>14.860000000000001</c:v>
+                  <c:v>14.860000000000003</c:v>
                 </c:pt>
                 <c:pt idx="11">
                   <c:v>35.630000000000003</c:v>
@@ -10173,16 +10637,16 @@
                   <c:v>29.66</c:v>
                 </c:pt>
                 <c:pt idx="8">
-                  <c:v>16.959999999999997</c:v>
+                  <c:v>16.959999999999994</c:v>
                 </c:pt>
                 <c:pt idx="9">
-                  <c:v>23.259999999999998</c:v>
+                  <c:v>23.259999999999994</c:v>
                 </c:pt>
                 <c:pt idx="10">
                   <c:v>15.62</c:v>
                 </c:pt>
                 <c:pt idx="11">
-                  <c:v>25.439999999999998</c:v>
+                  <c:v>25.439999999999994</c:v>
                 </c:pt>
                 <c:pt idx="12">
                   <c:v>21.45</c:v>
@@ -10292,19 +10756,19 @@
                   <c:v>16.7</c:v>
                 </c:pt>
                 <c:pt idx="3">
-                  <c:v>18.439999999999998</c:v>
+                  <c:v>18.439999999999994</c:v>
                 </c:pt>
                 <c:pt idx="4">
                   <c:v>21.04</c:v>
                 </c:pt>
                 <c:pt idx="5">
-                  <c:v>17.939999999999998</c:v>
+                  <c:v>17.939999999999994</c:v>
                 </c:pt>
                 <c:pt idx="6">
                   <c:v>18.34</c:v>
                 </c:pt>
                 <c:pt idx="7">
-                  <c:v>27.959999999999997</c:v>
+                  <c:v>27.959999999999994</c:v>
                 </c:pt>
                 <c:pt idx="8">
                   <c:v>22.51</c:v>
@@ -10450,7 +10914,7 @@
                   <c:v>17.8</c:v>
                 </c:pt>
                 <c:pt idx="11">
-                  <c:v>37.800000000000011</c:v>
+                  <c:v>37.800000000000004</c:v>
                 </c:pt>
                 <c:pt idx="12">
                   <c:v>39.1</c:v>
@@ -10470,14 +10934,13 @@
             </c:ext>
           </c:extLst>
         </c:ser>
-        <c:dLbls/>
         <c:gapWidth val="219"/>
         <c:overlap val="-27"/>
-        <c:axId val="104487552"/>
-        <c:axId val="104505728"/>
+        <c:axId val="109775104"/>
+        <c:axId val="109793280"/>
       </c:barChart>
       <c:catAx>
-        <c:axId val="104487552"/>
+        <c:axId val="109775104"/>
         <c:scaling>
           <c:orientation val="minMax"/>
         </c:scaling>
@@ -10518,14 +10981,14 @@
             <a:endParaRPr lang="pt-PT"/>
           </a:p>
         </c:txPr>
-        <c:crossAx val="104505728"/>
+        <c:crossAx val="109793280"/>
         <c:crosses val="autoZero"/>
         <c:auto val="1"/>
         <c:lblAlgn val="ctr"/>
         <c:lblOffset val="100"/>
       </c:catAx>
       <c:valAx>
-        <c:axId val="104505728"/>
+        <c:axId val="109793280"/>
         <c:scaling>
           <c:orientation val="minMax"/>
         </c:scaling>
@@ -10574,7 +11037,7 @@
             <a:endParaRPr lang="pt-PT"/>
           </a:p>
         </c:txPr>
-        <c:crossAx val="104487552"/>
+        <c:crossAx val="109775104"/>
         <c:crosses val="autoZero"/>
         <c:crossBetween val="between"/>
       </c:valAx>
@@ -10652,6 +11115,7 @@
 
 <file path=ppt/charts/chart9.xml><?xml version="1.0" encoding="utf-8"?>
 <c:chartSpace xmlns:c="http://schemas.openxmlformats.org/drawingml/2006/chart" xmlns:a="http://schemas.openxmlformats.org/drawingml/2006/main" xmlns:r="http://schemas.openxmlformats.org/officeDocument/2006/relationships">
+  <c:date1904 val="1"/>
   <c:lang val="pt-PT"/>
   <c:chart>
     <c:title>
@@ -10825,7 +11289,7 @@
                   <c:v>83.63</c:v>
                 </c:pt>
                 <c:pt idx="8">
-                  <c:v>0.75000000000000011</c:v>
+                  <c:v>0.75000000000000022</c:v>
                 </c:pt>
                 <c:pt idx="9">
                   <c:v>127.9</c:v>
@@ -10846,7 +11310,7 @@
                   <c:v>75.069999999999993</c:v>
                 </c:pt>
                 <c:pt idx="15">
-                  <c:v>44.339999999999996</c:v>
+                  <c:v>44.34</c:v>
                 </c:pt>
               </c:numCache>
             </c:numRef>
@@ -10941,7 +11405,7 @@
                   <c:v>22.82</c:v>
                 </c:pt>
                 <c:pt idx="2">
-                  <c:v>23.310000000000002</c:v>
+                  <c:v>23.310000000000006</c:v>
                 </c:pt>
                 <c:pt idx="3">
                   <c:v>18.2</c:v>
@@ -10956,7 +11420,7 @@
                   <c:v>15.57</c:v>
                 </c:pt>
                 <c:pt idx="7">
-                  <c:v>55.339999999999996</c:v>
+                  <c:v>55.34</c:v>
                 </c:pt>
                 <c:pt idx="8">
                   <c:v>0.45</c:v>
@@ -10965,7 +11429,7 @@
                   <c:v>81.010000000000005</c:v>
                 </c:pt>
                 <c:pt idx="10">
-                  <c:v>0.41000000000000003</c:v>
+                  <c:v>0.41000000000000009</c:v>
                 </c:pt>
                 <c:pt idx="11">
                   <c:v>19.37</c:v>
@@ -10977,10 +11441,10 @@
                   <c:v>44.6</c:v>
                 </c:pt>
                 <c:pt idx="14">
-                  <c:v>57.290000000000006</c:v>
+                  <c:v>57.290000000000013</c:v>
                 </c:pt>
                 <c:pt idx="15">
-                  <c:v>31.779999999999998</c:v>
+                  <c:v>31.779999999999994</c:v>
                 </c:pt>
               </c:numCache>
             </c:numRef>
@@ -11072,7 +11536,7 @@
                   <c:v>109.8</c:v>
                 </c:pt>
                 <c:pt idx="1">
-                  <c:v>21.110000000000003</c:v>
+                  <c:v>21.110000000000007</c:v>
                 </c:pt>
                 <c:pt idx="2">
                   <c:v>21.7</c:v>
@@ -11084,22 +11548,22 @@
                   <c:v>160.34</c:v>
                 </c:pt>
                 <c:pt idx="5">
-                  <c:v>19.239999999999995</c:v>
+                  <c:v>19.239999999999991</c:v>
                 </c:pt>
                 <c:pt idx="6">
-                  <c:v>20.650000000000002</c:v>
+                  <c:v>20.650000000000006</c:v>
                 </c:pt>
                 <c:pt idx="7">
                   <c:v>122.8</c:v>
                 </c:pt>
                 <c:pt idx="8">
-                  <c:v>0.96000000000000008</c:v>
+                  <c:v>0.96000000000000019</c:v>
                 </c:pt>
                 <c:pt idx="9">
                   <c:v>167.19</c:v>
                 </c:pt>
                 <c:pt idx="10">
-                  <c:v>0.8600000000000001</c:v>
+                  <c:v>0.86000000000000021</c:v>
                 </c:pt>
                 <c:pt idx="11">
                   <c:v>15.93</c:v>
@@ -11111,7 +11575,7 @@
                   <c:v>134.13999999999999</c:v>
                 </c:pt>
                 <c:pt idx="14">
-                  <c:v>153.85000000000002</c:v>
+                  <c:v>153.85000000000005</c:v>
                 </c:pt>
                 <c:pt idx="15">
                   <c:v>65.58</c:v>
@@ -11206,7 +11670,7 @@
                   <c:v>74.95</c:v>
                 </c:pt>
                 <c:pt idx="1">
-                  <c:v>33.339999999999996</c:v>
+                  <c:v>33.340000000000003</c:v>
                 </c:pt>
                 <c:pt idx="2">
                   <c:v>31.75</c:v>
@@ -11218,7 +11682,7 @@
                   <c:v>75.349999999999994</c:v>
                 </c:pt>
                 <c:pt idx="5">
-                  <c:v>27.630000000000003</c:v>
+                  <c:v>27.630000000000006</c:v>
                 </c:pt>
                 <c:pt idx="6">
                   <c:v>26.5</c:v>
@@ -11233,10 +11697,10 @@
                   <c:v>133.28</c:v>
                 </c:pt>
                 <c:pt idx="10">
-                  <c:v>0.95000000000000007</c:v>
+                  <c:v>0.95000000000000018</c:v>
                 </c:pt>
                 <c:pt idx="11">
-                  <c:v>25.479999999999997</c:v>
+                  <c:v>25.479999999999993</c:v>
                 </c:pt>
                 <c:pt idx="12">
                   <c:v>28.39</c:v>
@@ -11390,14 +11854,13 @@
             </c:ext>
           </c:extLst>
         </c:ser>
-        <c:dLbls/>
         <c:gapWidth val="219"/>
         <c:overlap val="-27"/>
-        <c:axId val="104458880"/>
-        <c:axId val="104534400"/>
+        <c:axId val="109934848"/>
+        <c:axId val="109940736"/>
       </c:barChart>
       <c:catAx>
-        <c:axId val="104458880"/>
+        <c:axId val="109934848"/>
         <c:scaling>
           <c:orientation val="minMax"/>
         </c:scaling>
@@ -11438,14 +11901,14 @@
             <a:endParaRPr lang="pt-PT"/>
           </a:p>
         </c:txPr>
-        <c:crossAx val="104534400"/>
+        <c:crossAx val="109940736"/>
         <c:crosses val="autoZero"/>
         <c:auto val="1"/>
         <c:lblAlgn val="ctr"/>
         <c:lblOffset val="100"/>
       </c:catAx>
       <c:valAx>
-        <c:axId val="104534400"/>
+        <c:axId val="109940736"/>
         <c:scaling>
           <c:orientation val="minMax"/>
         </c:scaling>
@@ -11494,7 +11957,7 @@
             <a:endParaRPr lang="pt-PT"/>
           </a:p>
         </c:txPr>
-        <c:crossAx val="104458880"/>
+        <c:crossAx val="109934848"/>
         <c:crosses val="autoZero"/>
         <c:crossBetween val="between"/>
       </c:valAx>
@@ -19915,7 +20378,7 @@
         <cdr:cNvPr id="2" name="CaixaDeTexto 1">
           <a:extLst xmlns:a="http://schemas.openxmlformats.org/drawingml/2006/main">
             <a:ext uri="{FF2B5EF4-FFF2-40B4-BE49-F238E27FC236}">
-              <a16:creationId xmlns:a16="http://schemas.microsoft.com/office/drawing/2014/main" xmlns="" id="{AF9CA311-7E51-4E99-A49C-6ED7ED9A3B34}"/>
+              <a16:creationId xmlns="" xmlns:a16="http://schemas.microsoft.com/office/drawing/2014/main" id="{AF9CA311-7E51-4E99-A49C-6ED7ED9A3B34}"/>
             </a:ext>
           </a:extLst>
         </cdr:cNvPr>
@@ -19964,7 +20427,7 @@
         <cdr:cNvPr id="2" name="CaixaDeTexto 1">
           <a:extLst xmlns:a="http://schemas.openxmlformats.org/drawingml/2006/main">
             <a:ext uri="{FF2B5EF4-FFF2-40B4-BE49-F238E27FC236}">
-              <a16:creationId xmlns:a16="http://schemas.microsoft.com/office/drawing/2014/main" xmlns="" id="{63E8B198-3C56-4B40-B4D1-F14BF473AF7D}"/>
+              <a16:creationId xmlns="" xmlns:a16="http://schemas.microsoft.com/office/drawing/2014/main" id="{63E8B198-3C56-4B40-B4D1-F14BF473AF7D}"/>
             </a:ext>
           </a:extLst>
         </cdr:cNvPr>
@@ -20143,6 +20606,7 @@
           <a:p>
             <a:fld id="{191CB419-2379-4E9F-BAB8-2658C7CE6563}" type="datetimeFigureOut">
               <a:rPr lang="pt-PT" smtClean="0"/>
+              <a:pPr/>
               <a:t>23/12/2020</a:t>
             </a:fld>
             <a:endParaRPr lang="pt-PT"/>
@@ -20304,6 +20768,7 @@
           <a:p>
             <a:fld id="{3DDD1265-37B5-43E3-8B8E-14BA8B31F64F}" type="slidenum">
               <a:rPr lang="pt-PT" smtClean="0"/>
+              <a:pPr/>
               <a:t>‹nº›</a:t>
             </a:fld>
             <a:endParaRPr lang="pt-PT"/>
@@ -20475,6 +20940,7 @@
           <a:p>
             <a:fld id="{3DDD1265-37B5-43E3-8B8E-14BA8B31F64F}" type="slidenum">
               <a:rPr lang="pt-PT" smtClean="0"/>
+              <a:pPr/>
               <a:t>14</a:t>
             </a:fld>
             <a:endParaRPr lang="pt-PT"/>
@@ -23632,7 +24098,7 @@
           <p:cNvPr id="7" name="Marcador de Posição de Conteúdo 6">
             <a:extLst>
               <a:ext uri="{FF2B5EF4-FFF2-40B4-BE49-F238E27FC236}">
-                <a16:creationId xmlns:a16="http://schemas.microsoft.com/office/drawing/2014/main" xmlns="" id="{AB1C485F-D356-4F5B-98C9-C8CBE1DE7694}"/>
+                <a16:creationId xmlns="" xmlns:a16="http://schemas.microsoft.com/office/drawing/2014/main" id="{AB1C485F-D356-4F5B-98C9-C8CBE1DE7694}"/>
               </a:ext>
             </a:extLst>
           </p:cNvPr>
@@ -23643,7 +24109,7 @@
             <p:ph idx="1"/>
             <p:extLst>
               <p:ext uri="{D42A27DB-BD31-4B8C-83A1-F6EECF244321}">
-                <p14:modId xmlns:p14="http://schemas.microsoft.com/office/powerpoint/2010/main" xmlns="" val="1677835944"/>
+                <p14:modId xmlns="" xmlns:p14="http://schemas.microsoft.com/office/powerpoint/2010/main" val="1677835944"/>
               </p:ext>
             </p:extLst>
           </p:nvPr>
@@ -23714,7 +24180,7 @@
         </p:txBody>
       </p:sp>
       <mc:AlternateContent xmlns:mc="http://schemas.openxmlformats.org/markup-compatibility/2006">
-        <mc:Choice xmlns:a14="http://schemas.microsoft.com/office/drawing/2010/main" xmlns="" Requires="a14">
+        <mc:Choice xmlns="" xmlns:a14="http://schemas.microsoft.com/office/drawing/2010/main" Requires="a14">
           <p:sp>
             <p:nvSpPr>
               <p:cNvPr id="7" name="CaixaDeTexto 1">
@@ -23863,7 +24329,7 @@
               <p:cNvPr id="7" name="CaixaDeTexto 1">
                 <a:extLst>
                   <a:ext uri="{FF2B5EF4-FFF2-40B4-BE49-F238E27FC236}">
-                    <a16:creationId xmlns:a16="http://schemas.microsoft.com/office/drawing/2014/main" xmlns="" xmlns:a14="http://schemas.microsoft.com/office/drawing/2010/main" id="{6D906550-C179-476E-B11B-49E70F87DADE}"/>
+                    <a16:creationId xmlns:a14="http://schemas.microsoft.com/office/drawing/2010/main" xmlns="" xmlns:a16="http://schemas.microsoft.com/office/drawing/2014/main" id="{6D906550-C179-476E-B11B-49E70F87DADE}"/>
                   </a:ext>
                 </a:extLst>
               </p:cNvPr>
@@ -23907,7 +24373,7 @@
           <p:cNvPr id="8" name="Marcador de Posição de Conteúdo 7">
             <a:extLst>
               <a:ext uri="{FF2B5EF4-FFF2-40B4-BE49-F238E27FC236}">
-                <a16:creationId xmlns:a16="http://schemas.microsoft.com/office/drawing/2014/main" xmlns="" id="{973B0343-5FB9-4C57-88B2-28E32C378AAF}"/>
+                <a16:creationId xmlns="" xmlns:a16="http://schemas.microsoft.com/office/drawing/2014/main" id="{973B0343-5FB9-4C57-88B2-28E32C378AAF}"/>
               </a:ext>
             </a:extLst>
           </p:cNvPr>
@@ -23918,7 +24384,7 @@
             <p:ph idx="1"/>
             <p:extLst>
               <p:ext uri="{D42A27DB-BD31-4B8C-83A1-F6EECF244321}">
-                <p14:modId xmlns:p14="http://schemas.microsoft.com/office/powerpoint/2010/main" xmlns="" val="1345262532"/>
+                <p14:modId xmlns="" xmlns:p14="http://schemas.microsoft.com/office/powerpoint/2010/main" val="1345262532"/>
               </p:ext>
             </p:extLst>
           </p:nvPr>
@@ -23989,7 +24455,7 @@
         </p:txBody>
       </p:sp>
       <mc:AlternateContent xmlns:mc="http://schemas.openxmlformats.org/markup-compatibility/2006">
-        <mc:Choice xmlns:a14="http://schemas.microsoft.com/office/drawing/2010/main" xmlns="" Requires="a14">
+        <mc:Choice xmlns="" xmlns:a14="http://schemas.microsoft.com/office/drawing/2010/main" Requires="a14">
           <p:sp>
             <p:nvSpPr>
               <p:cNvPr id="7" name="CaixaDeTexto 1">
@@ -24138,7 +24604,7 @@
               <p:cNvPr id="7" name="CaixaDeTexto 1">
                 <a:extLst>
                   <a:ext uri="{FF2B5EF4-FFF2-40B4-BE49-F238E27FC236}">
-                    <a16:creationId xmlns:a16="http://schemas.microsoft.com/office/drawing/2014/main" xmlns="" xmlns:a14="http://schemas.microsoft.com/office/drawing/2010/main" id="{1F0C1465-0EC1-499B-99E6-1A142257014F}"/>
+                    <a16:creationId xmlns:a14="http://schemas.microsoft.com/office/drawing/2010/main" xmlns="" xmlns:a16="http://schemas.microsoft.com/office/drawing/2014/main" id="{1F0C1465-0EC1-499B-99E6-1A142257014F}"/>
                   </a:ext>
                 </a:extLst>
               </p:cNvPr>
@@ -24182,7 +24648,7 @@
           <p:cNvPr id="10" name="Marcador de Posição de Conteúdo 9">
             <a:extLst>
               <a:ext uri="{FF2B5EF4-FFF2-40B4-BE49-F238E27FC236}">
-                <a16:creationId xmlns:a16="http://schemas.microsoft.com/office/drawing/2014/main" xmlns="" id="{483934FF-3F71-43DC-9C5A-3D6258DEB181}"/>
+                <a16:creationId xmlns="" xmlns:a16="http://schemas.microsoft.com/office/drawing/2014/main" id="{483934FF-3F71-43DC-9C5A-3D6258DEB181}"/>
               </a:ext>
             </a:extLst>
           </p:cNvPr>
@@ -24193,7 +24659,7 @@
             <p:ph idx="1"/>
             <p:extLst>
               <p:ext uri="{D42A27DB-BD31-4B8C-83A1-F6EECF244321}">
-                <p14:modId xmlns:p14="http://schemas.microsoft.com/office/powerpoint/2010/main" xmlns="" val="2234006515"/>
+                <p14:modId xmlns="" xmlns:p14="http://schemas.microsoft.com/office/powerpoint/2010/main" val="2234006515"/>
               </p:ext>
             </p:extLst>
           </p:nvPr>
@@ -24264,7 +24730,7 @@
         </p:txBody>
       </p:sp>
       <mc:AlternateContent xmlns:mc="http://schemas.openxmlformats.org/markup-compatibility/2006">
-        <mc:Choice xmlns:a14="http://schemas.microsoft.com/office/drawing/2010/main" xmlns="" Requires="a14">
+        <mc:Choice xmlns="" xmlns:a14="http://schemas.microsoft.com/office/drawing/2010/main" Requires="a14">
           <p:sp>
             <p:nvSpPr>
               <p:cNvPr id="6" name="CaixaDeTexto 1">
@@ -24932,7 +25398,7 @@
               <p:cNvPr id="6" name="CaixaDeTexto 1">
                 <a:extLst>
                   <a:ext uri="{FF2B5EF4-FFF2-40B4-BE49-F238E27FC236}">
-                    <a16:creationId xmlns:a16="http://schemas.microsoft.com/office/drawing/2014/main" xmlns="" id="{460D798F-01F1-48B1-B3A3-FCB876C25A7C}"/>
+                    <a16:creationId xmlns="" xmlns:a16="http://schemas.microsoft.com/office/drawing/2014/main" id="{460D798F-01F1-48B1-B3A3-FCB876C25A7C}"/>
                   </a:ext>
                 </a:extLst>
               </p:cNvPr>
@@ -24976,7 +25442,7 @@
           <p:cNvPr id="15" name="Oval 14">
             <a:extLst>
               <a:ext uri="{FF2B5EF4-FFF2-40B4-BE49-F238E27FC236}">
-                <a16:creationId xmlns:a16="http://schemas.microsoft.com/office/drawing/2014/main" xmlns="" id="{44A36393-E968-4E93-8A40-1C69EDA50F41}"/>
+                <a16:creationId xmlns="" xmlns:a16="http://schemas.microsoft.com/office/drawing/2014/main" id="{44A36393-E968-4E93-8A40-1C69EDA50F41}"/>
               </a:ext>
             </a:extLst>
           </p:cNvPr>
@@ -25023,7 +25489,7 @@
           <p:cNvPr id="16" name="Oval 15">
             <a:extLst>
               <a:ext uri="{FF2B5EF4-FFF2-40B4-BE49-F238E27FC236}">
-                <a16:creationId xmlns:a16="http://schemas.microsoft.com/office/drawing/2014/main" xmlns="" id="{87FCC041-FDBC-41CC-85C5-387DC236B4E1}"/>
+                <a16:creationId xmlns="" xmlns:a16="http://schemas.microsoft.com/office/drawing/2014/main" id="{87FCC041-FDBC-41CC-85C5-387DC236B4E1}"/>
               </a:ext>
             </a:extLst>
           </p:cNvPr>
@@ -25070,7 +25536,7 @@
           <p:cNvPr id="9" name="Marcador de Posição de Conteúdo 8">
             <a:extLst>
               <a:ext uri="{FF2B5EF4-FFF2-40B4-BE49-F238E27FC236}">
-                <a16:creationId xmlns:a16="http://schemas.microsoft.com/office/drawing/2014/main" xmlns="" id="{8CBC1960-47FA-4C42-BD6D-4D1E37F3475D}"/>
+                <a16:creationId xmlns="" xmlns:a16="http://schemas.microsoft.com/office/drawing/2014/main" id="{8CBC1960-47FA-4C42-BD6D-4D1E37F3475D}"/>
               </a:ext>
             </a:extLst>
           </p:cNvPr>
@@ -25081,7 +25547,7 @@
             <p:ph idx="1"/>
             <p:extLst>
               <p:ext uri="{D42A27DB-BD31-4B8C-83A1-F6EECF244321}">
-                <p14:modId xmlns:p14="http://schemas.microsoft.com/office/powerpoint/2010/main" xmlns="" val="2634702654"/>
+                <p14:modId xmlns="" xmlns:p14="http://schemas.microsoft.com/office/powerpoint/2010/main" val="2634702654"/>
               </p:ext>
             </p:extLst>
           </p:nvPr>
@@ -25101,7 +25567,7 @@
           <p:cNvPr id="2" name="CaixaDeTexto 1">
             <a:extLst>
               <a:ext uri="{FF2B5EF4-FFF2-40B4-BE49-F238E27FC236}">
-                <a16:creationId xmlns:a16="http://schemas.microsoft.com/office/drawing/2014/main" xmlns="" id="{387CDC1B-6928-461C-94AC-46A9BA262EE5}"/>
+                <a16:creationId xmlns="" xmlns:a16="http://schemas.microsoft.com/office/drawing/2014/main" id="{387CDC1B-6928-461C-94AC-46A9BA262EE5}"/>
               </a:ext>
             </a:extLst>
           </p:cNvPr>
@@ -25172,7 +25638,7 @@
           <p:cNvPr id="4" name="Seta: Para Baixo 3">
             <a:extLst>
               <a:ext uri="{FF2B5EF4-FFF2-40B4-BE49-F238E27FC236}">
-                <a16:creationId xmlns:a16="http://schemas.microsoft.com/office/drawing/2014/main" xmlns="" id="{0D1F0B9A-5DA7-4815-BE0D-515B7238DC57}"/>
+                <a16:creationId xmlns="" xmlns:a16="http://schemas.microsoft.com/office/drawing/2014/main" id="{0D1F0B9A-5DA7-4815-BE0D-515B7238DC57}"/>
               </a:ext>
             </a:extLst>
           </p:cNvPr>
@@ -25218,7 +25684,7 @@
           <p:cNvPr id="7" name="Seta: Para Baixo 6">
             <a:extLst>
               <a:ext uri="{FF2B5EF4-FFF2-40B4-BE49-F238E27FC236}">
-                <a16:creationId xmlns:a16="http://schemas.microsoft.com/office/drawing/2014/main" xmlns="" id="{E5C287F9-7B45-48E2-9C60-304032C6EEE5}"/>
+                <a16:creationId xmlns="" xmlns:a16="http://schemas.microsoft.com/office/drawing/2014/main" id="{E5C287F9-7B45-48E2-9C60-304032C6EEE5}"/>
               </a:ext>
             </a:extLst>
           </p:cNvPr>
@@ -25289,7 +25755,7 @@
           <p:cNvPr id="2" name="Título 1">
             <a:extLst>
               <a:ext uri="{FF2B5EF4-FFF2-40B4-BE49-F238E27FC236}">
-                <a16:creationId xmlns:a16="http://schemas.microsoft.com/office/drawing/2014/main" xmlns="" id="{7B2DD2CD-E12B-4525-8422-B00034AB388C}"/>
+                <a16:creationId xmlns="" xmlns:a16="http://schemas.microsoft.com/office/drawing/2014/main" id="{7B2DD2CD-E12B-4525-8422-B00034AB388C}"/>
               </a:ext>
             </a:extLst>
           </p:cNvPr>
@@ -25317,7 +25783,7 @@
           <p:cNvPr id="4" name="Retângulo 3">
             <a:extLst>
               <a:ext uri="{FF2B5EF4-FFF2-40B4-BE49-F238E27FC236}">
-                <a16:creationId xmlns:a16="http://schemas.microsoft.com/office/drawing/2014/main" xmlns="" id="{C0BDAD38-C781-41A9-8B67-F38BBE76E72A}"/>
+                <a16:creationId xmlns="" xmlns:a16="http://schemas.microsoft.com/office/drawing/2014/main" id="{C0BDAD38-C781-41A9-8B67-F38BBE76E72A}"/>
               </a:ext>
             </a:extLst>
           </p:cNvPr>
@@ -25369,7 +25835,7 @@
           <p:cNvPr id="5" name="Retângulo 4">
             <a:extLst>
               <a:ext uri="{FF2B5EF4-FFF2-40B4-BE49-F238E27FC236}">
-                <a16:creationId xmlns:a16="http://schemas.microsoft.com/office/drawing/2014/main" xmlns="" id="{CA34A0B6-BC35-400B-8BEE-636299379076}"/>
+                <a16:creationId xmlns="" xmlns:a16="http://schemas.microsoft.com/office/drawing/2014/main" id="{CA34A0B6-BC35-400B-8BEE-636299379076}"/>
               </a:ext>
             </a:extLst>
           </p:cNvPr>
@@ -25416,7 +25882,7 @@
           <p:cNvPr id="8" name="Seta: Para a Direita 7">
             <a:extLst>
               <a:ext uri="{FF2B5EF4-FFF2-40B4-BE49-F238E27FC236}">
-                <a16:creationId xmlns:a16="http://schemas.microsoft.com/office/drawing/2014/main" xmlns="" id="{F98B5199-1856-4AF9-823E-F9778866F240}"/>
+                <a16:creationId xmlns="" xmlns:a16="http://schemas.microsoft.com/office/drawing/2014/main" id="{F98B5199-1856-4AF9-823E-F9778866F240}"/>
               </a:ext>
             </a:extLst>
           </p:cNvPr>
@@ -25462,7 +25928,7 @@
           <p:cNvPr id="9" name="Retângulo 8">
             <a:extLst>
               <a:ext uri="{FF2B5EF4-FFF2-40B4-BE49-F238E27FC236}">
-                <a16:creationId xmlns:a16="http://schemas.microsoft.com/office/drawing/2014/main" xmlns="" id="{1AA32650-06E0-42FF-9F24-586846B83EEF}"/>
+                <a16:creationId xmlns="" xmlns:a16="http://schemas.microsoft.com/office/drawing/2014/main" id="{1AA32650-06E0-42FF-9F24-586846B83EEF}"/>
               </a:ext>
             </a:extLst>
           </p:cNvPr>
@@ -25507,7 +25973,7 @@
           <p:cNvPr id="10" name="CaixaDeTexto 9">
             <a:extLst>
               <a:ext uri="{FF2B5EF4-FFF2-40B4-BE49-F238E27FC236}">
-                <a16:creationId xmlns:a16="http://schemas.microsoft.com/office/drawing/2014/main" xmlns="" id="{723ADB8C-7188-4244-99D2-29F31EDB3AD5}"/>
+                <a16:creationId xmlns="" xmlns:a16="http://schemas.microsoft.com/office/drawing/2014/main" id="{723ADB8C-7188-4244-99D2-29F31EDB3AD5}"/>
               </a:ext>
             </a:extLst>
           </p:cNvPr>
@@ -25543,7 +26009,7 @@
           <p:cNvPr id="11" name="Marcador de Posição de Conteúdo 10">
             <a:extLst>
               <a:ext uri="{FF2B5EF4-FFF2-40B4-BE49-F238E27FC236}">
-                <a16:creationId xmlns:a16="http://schemas.microsoft.com/office/drawing/2014/main" xmlns="" id="{10777436-016F-4617-B018-85A590435F94}"/>
+                <a16:creationId xmlns="" xmlns:a16="http://schemas.microsoft.com/office/drawing/2014/main" id="{10777436-016F-4617-B018-85A590435F94}"/>
               </a:ext>
             </a:extLst>
           </p:cNvPr>
@@ -25594,7 +26060,7 @@
           <p:cNvPr id="13" name="Retângulo 12">
             <a:extLst>
               <a:ext uri="{FF2B5EF4-FFF2-40B4-BE49-F238E27FC236}">
-                <a16:creationId xmlns:a16="http://schemas.microsoft.com/office/drawing/2014/main" xmlns="" id="{3B5B346E-6D2A-4217-978D-5C9C6FCA9861}"/>
+                <a16:creationId xmlns="" xmlns:a16="http://schemas.microsoft.com/office/drawing/2014/main" id="{3B5B346E-6D2A-4217-978D-5C9C6FCA9861}"/>
               </a:ext>
             </a:extLst>
           </p:cNvPr>
@@ -25648,7 +26114,7 @@
           <p:cNvPr id="14" name="Retângulo 13">
             <a:extLst>
               <a:ext uri="{FF2B5EF4-FFF2-40B4-BE49-F238E27FC236}">
-                <a16:creationId xmlns:a16="http://schemas.microsoft.com/office/drawing/2014/main" xmlns="" id="{ADEE454C-52D6-4A7F-99AC-557786175935}"/>
+                <a16:creationId xmlns="" xmlns:a16="http://schemas.microsoft.com/office/drawing/2014/main" id="{ADEE454C-52D6-4A7F-99AC-557786175935}"/>
               </a:ext>
             </a:extLst>
           </p:cNvPr>
@@ -25707,7 +26173,7 @@
           <p:cNvPr id="17" name="Seta: Para a Direita 16">
             <a:extLst>
               <a:ext uri="{FF2B5EF4-FFF2-40B4-BE49-F238E27FC236}">
-                <a16:creationId xmlns:a16="http://schemas.microsoft.com/office/drawing/2014/main" xmlns="" id="{58570091-5F75-432C-A902-82E9D2C6EEAA}"/>
+                <a16:creationId xmlns="" xmlns:a16="http://schemas.microsoft.com/office/drawing/2014/main" id="{58570091-5F75-432C-A902-82E9D2C6EEAA}"/>
               </a:ext>
             </a:extLst>
           </p:cNvPr>
@@ -25753,7 +26219,7 @@
           <p:cNvPr id="18" name="CaixaDeTexto 17">
             <a:extLst>
               <a:ext uri="{FF2B5EF4-FFF2-40B4-BE49-F238E27FC236}">
-                <a16:creationId xmlns:a16="http://schemas.microsoft.com/office/drawing/2014/main" xmlns="" id="{561403E5-0E0C-44FB-8919-9F28ABAF7DA9}"/>
+                <a16:creationId xmlns="" xmlns:a16="http://schemas.microsoft.com/office/drawing/2014/main" id="{561403E5-0E0C-44FB-8919-9F28ABAF7DA9}"/>
               </a:ext>
             </a:extLst>
           </p:cNvPr>
@@ -25830,7 +26296,7 @@
     </p:spTree>
     <p:extLst>
       <p:ext uri="{BB962C8B-B14F-4D97-AF65-F5344CB8AC3E}">
-        <p14:creationId xmlns:p14="http://schemas.microsoft.com/office/powerpoint/2010/main" xmlns="" val="661826028"/>
+        <p14:creationId xmlns="" xmlns:p14="http://schemas.microsoft.com/office/powerpoint/2010/main" val="661826028"/>
       </p:ext>
     </p:extLst>
   </p:cSld>
@@ -25862,7 +26328,7 @@
           <p:cNvPr id="2" name="Título 1">
             <a:extLst>
               <a:ext uri="{FF2B5EF4-FFF2-40B4-BE49-F238E27FC236}">
-                <a16:creationId xmlns:a16="http://schemas.microsoft.com/office/drawing/2014/main" xmlns="" id="{7B2DD2CD-E12B-4525-8422-B00034AB388C}"/>
+                <a16:creationId xmlns="" xmlns:a16="http://schemas.microsoft.com/office/drawing/2014/main" id="{7B2DD2CD-E12B-4525-8422-B00034AB388C}"/>
               </a:ext>
             </a:extLst>
           </p:cNvPr>
@@ -25890,7 +26356,7 @@
           <p:cNvPr id="4" name="Retângulo 3">
             <a:extLst>
               <a:ext uri="{FF2B5EF4-FFF2-40B4-BE49-F238E27FC236}">
-                <a16:creationId xmlns:a16="http://schemas.microsoft.com/office/drawing/2014/main" xmlns="" id="{C0BDAD38-C781-41A9-8B67-F38BBE76E72A}"/>
+                <a16:creationId xmlns="" xmlns:a16="http://schemas.microsoft.com/office/drawing/2014/main" id="{C0BDAD38-C781-41A9-8B67-F38BBE76E72A}"/>
               </a:ext>
             </a:extLst>
           </p:cNvPr>
@@ -25942,7 +26408,7 @@
           <p:cNvPr id="5" name="Retângulo 4">
             <a:extLst>
               <a:ext uri="{FF2B5EF4-FFF2-40B4-BE49-F238E27FC236}">
-                <a16:creationId xmlns:a16="http://schemas.microsoft.com/office/drawing/2014/main" xmlns="" id="{CA34A0B6-BC35-400B-8BEE-636299379076}"/>
+                <a16:creationId xmlns="" xmlns:a16="http://schemas.microsoft.com/office/drawing/2014/main" id="{CA34A0B6-BC35-400B-8BEE-636299379076}"/>
               </a:ext>
             </a:extLst>
           </p:cNvPr>
@@ -25989,7 +26455,7 @@
           <p:cNvPr id="8" name="Seta: Para a Direita 7">
             <a:extLst>
               <a:ext uri="{FF2B5EF4-FFF2-40B4-BE49-F238E27FC236}">
-                <a16:creationId xmlns:a16="http://schemas.microsoft.com/office/drawing/2014/main" xmlns="" id="{F98B5199-1856-4AF9-823E-F9778866F240}"/>
+                <a16:creationId xmlns="" xmlns:a16="http://schemas.microsoft.com/office/drawing/2014/main" id="{F98B5199-1856-4AF9-823E-F9778866F240}"/>
               </a:ext>
             </a:extLst>
           </p:cNvPr>
@@ -26035,7 +26501,7 @@
           <p:cNvPr id="9" name="Retângulo 8">
             <a:extLst>
               <a:ext uri="{FF2B5EF4-FFF2-40B4-BE49-F238E27FC236}">
-                <a16:creationId xmlns:a16="http://schemas.microsoft.com/office/drawing/2014/main" xmlns="" id="{1AA32650-06E0-42FF-9F24-586846B83EEF}"/>
+                <a16:creationId xmlns="" xmlns:a16="http://schemas.microsoft.com/office/drawing/2014/main" id="{1AA32650-06E0-42FF-9F24-586846B83EEF}"/>
               </a:ext>
             </a:extLst>
           </p:cNvPr>
@@ -26080,7 +26546,7 @@
           <p:cNvPr id="10" name="CaixaDeTexto 9">
             <a:extLst>
               <a:ext uri="{FF2B5EF4-FFF2-40B4-BE49-F238E27FC236}">
-                <a16:creationId xmlns:a16="http://schemas.microsoft.com/office/drawing/2014/main" xmlns="" id="{723ADB8C-7188-4244-99D2-29F31EDB3AD5}"/>
+                <a16:creationId xmlns="" xmlns:a16="http://schemas.microsoft.com/office/drawing/2014/main" id="{723ADB8C-7188-4244-99D2-29F31EDB3AD5}"/>
               </a:ext>
             </a:extLst>
           </p:cNvPr>
@@ -26116,7 +26582,7 @@
           <p:cNvPr id="11" name="Marcador de Posição de Conteúdo 10">
             <a:extLst>
               <a:ext uri="{FF2B5EF4-FFF2-40B4-BE49-F238E27FC236}">
-                <a16:creationId xmlns:a16="http://schemas.microsoft.com/office/drawing/2014/main" xmlns="" id="{10777436-016F-4617-B018-85A590435F94}"/>
+                <a16:creationId xmlns="" xmlns:a16="http://schemas.microsoft.com/office/drawing/2014/main" id="{10777436-016F-4617-B018-85A590435F94}"/>
               </a:ext>
             </a:extLst>
           </p:cNvPr>
@@ -26164,7 +26630,7 @@
           <p:cNvPr id="13" name="Retângulo 12">
             <a:extLst>
               <a:ext uri="{FF2B5EF4-FFF2-40B4-BE49-F238E27FC236}">
-                <a16:creationId xmlns:a16="http://schemas.microsoft.com/office/drawing/2014/main" xmlns="" id="{3B5B346E-6D2A-4217-978D-5C9C6FCA9861}"/>
+                <a16:creationId xmlns="" xmlns:a16="http://schemas.microsoft.com/office/drawing/2014/main" id="{3B5B346E-6D2A-4217-978D-5C9C6FCA9861}"/>
               </a:ext>
             </a:extLst>
           </p:cNvPr>
@@ -26218,7 +26684,7 @@
           <p:cNvPr id="14" name="Retângulo 13">
             <a:extLst>
               <a:ext uri="{FF2B5EF4-FFF2-40B4-BE49-F238E27FC236}">
-                <a16:creationId xmlns:a16="http://schemas.microsoft.com/office/drawing/2014/main" xmlns="" id="{ADEE454C-52D6-4A7F-99AC-557786175935}"/>
+                <a16:creationId xmlns="" xmlns:a16="http://schemas.microsoft.com/office/drawing/2014/main" id="{ADEE454C-52D6-4A7F-99AC-557786175935}"/>
               </a:ext>
             </a:extLst>
           </p:cNvPr>
@@ -26277,7 +26743,7 @@
           <p:cNvPr id="17" name="Seta: Para a Direita 16">
             <a:extLst>
               <a:ext uri="{FF2B5EF4-FFF2-40B4-BE49-F238E27FC236}">
-                <a16:creationId xmlns:a16="http://schemas.microsoft.com/office/drawing/2014/main" xmlns="" id="{58570091-5F75-432C-A902-82E9D2C6EEAA}"/>
+                <a16:creationId xmlns="" xmlns:a16="http://schemas.microsoft.com/office/drawing/2014/main" id="{58570091-5F75-432C-A902-82E9D2C6EEAA}"/>
               </a:ext>
             </a:extLst>
           </p:cNvPr>
@@ -26323,7 +26789,7 @@
           <p:cNvPr id="18" name="CaixaDeTexto 17">
             <a:extLst>
               <a:ext uri="{FF2B5EF4-FFF2-40B4-BE49-F238E27FC236}">
-                <a16:creationId xmlns:a16="http://schemas.microsoft.com/office/drawing/2014/main" xmlns="" id="{561403E5-0E0C-44FB-8919-9F28ABAF7DA9}"/>
+                <a16:creationId xmlns="" xmlns:a16="http://schemas.microsoft.com/office/drawing/2014/main" id="{561403E5-0E0C-44FB-8919-9F28ABAF7DA9}"/>
               </a:ext>
             </a:extLst>
           </p:cNvPr>
@@ -26400,7 +26866,7 @@
     </p:spTree>
     <p:extLst>
       <p:ext uri="{BB962C8B-B14F-4D97-AF65-F5344CB8AC3E}">
-        <p14:creationId xmlns:p14="http://schemas.microsoft.com/office/powerpoint/2010/main" xmlns="" val="1050088074"/>
+        <p14:creationId xmlns="" xmlns:p14="http://schemas.microsoft.com/office/powerpoint/2010/main" val="1050088074"/>
       </p:ext>
     </p:extLst>
   </p:cSld>
@@ -26432,7 +26898,7 @@
           <p:cNvPr id="2" name="Título 1">
             <a:extLst>
               <a:ext uri="{FF2B5EF4-FFF2-40B4-BE49-F238E27FC236}">
-                <a16:creationId xmlns:a16="http://schemas.microsoft.com/office/drawing/2014/main" xmlns="" id="{702228D4-D061-4A19-8DEE-F0FDBE55A741}"/>
+                <a16:creationId xmlns="" xmlns:a16="http://schemas.microsoft.com/office/drawing/2014/main" id="{702228D4-D061-4A19-8DEE-F0FDBE55A741}"/>
               </a:ext>
             </a:extLst>
           </p:cNvPr>
@@ -26461,7 +26927,7 @@
           <p:cNvPr id="3" name="Marcador de Posição de Conteúdo 2">
             <a:extLst>
               <a:ext uri="{FF2B5EF4-FFF2-40B4-BE49-F238E27FC236}">
-                <a16:creationId xmlns:a16="http://schemas.microsoft.com/office/drawing/2014/main" xmlns="" id="{E60D12B4-E406-4B2D-8F05-FB70C750F163}"/>
+                <a16:creationId xmlns="" xmlns:a16="http://schemas.microsoft.com/office/drawing/2014/main" id="{E60D12B4-E406-4B2D-8F05-FB70C750F163}"/>
               </a:ext>
             </a:extLst>
           </p:cNvPr>
@@ -26486,7 +26952,7 @@
           <p:cNvPr id="4" name="Retângulo 3">
             <a:extLst>
               <a:ext uri="{FF2B5EF4-FFF2-40B4-BE49-F238E27FC236}">
-                <a16:creationId xmlns:a16="http://schemas.microsoft.com/office/drawing/2014/main" xmlns="" id="{974E549F-37BB-462C-9B24-6484F97E87C8}"/>
+                <a16:creationId xmlns="" xmlns:a16="http://schemas.microsoft.com/office/drawing/2014/main" id="{974E549F-37BB-462C-9B24-6484F97E87C8}"/>
               </a:ext>
             </a:extLst>
           </p:cNvPr>
@@ -26557,7 +27023,7 @@
           <p:cNvPr id="5" name="Retângulo 4">
             <a:extLst>
               <a:ext uri="{FF2B5EF4-FFF2-40B4-BE49-F238E27FC236}">
-                <a16:creationId xmlns:a16="http://schemas.microsoft.com/office/drawing/2014/main" xmlns="" id="{96BA5E0F-99FB-445A-9A33-3AF22D256248}"/>
+                <a16:creationId xmlns="" xmlns:a16="http://schemas.microsoft.com/office/drawing/2014/main" id="{96BA5E0F-99FB-445A-9A33-3AF22D256248}"/>
               </a:ext>
             </a:extLst>
           </p:cNvPr>
@@ -26628,7 +27094,7 @@
           <p:cNvPr id="6" name="Retângulo 5">
             <a:extLst>
               <a:ext uri="{FF2B5EF4-FFF2-40B4-BE49-F238E27FC236}">
-                <a16:creationId xmlns:a16="http://schemas.microsoft.com/office/drawing/2014/main" xmlns="" id="{2531B7CD-1914-4389-A1FF-0C88C4EF43EC}"/>
+                <a16:creationId xmlns="" xmlns:a16="http://schemas.microsoft.com/office/drawing/2014/main" id="{2531B7CD-1914-4389-A1FF-0C88C4EF43EC}"/>
               </a:ext>
             </a:extLst>
           </p:cNvPr>
@@ -26724,7 +27190,7 @@
     </p:spTree>
     <p:extLst>
       <p:ext uri="{BB962C8B-B14F-4D97-AF65-F5344CB8AC3E}">
-        <p14:creationId xmlns:p14="http://schemas.microsoft.com/office/powerpoint/2010/main" xmlns="" val="2403494876"/>
+        <p14:creationId xmlns="" xmlns:p14="http://schemas.microsoft.com/office/powerpoint/2010/main" val="2403494876"/>
       </p:ext>
     </p:extLst>
   </p:cSld>
@@ -26756,7 +27222,7 @@
           <p:cNvPr id="2" name="Título 1">
             <a:extLst>
               <a:ext uri="{FF2B5EF4-FFF2-40B4-BE49-F238E27FC236}">
-                <a16:creationId xmlns:a16="http://schemas.microsoft.com/office/drawing/2014/main" xmlns="" id="{5B184CB9-E063-4057-8F42-75AA222B4298}"/>
+                <a16:creationId xmlns="" xmlns:a16="http://schemas.microsoft.com/office/drawing/2014/main" id="{5B184CB9-E063-4057-8F42-75AA222B4298}"/>
               </a:ext>
             </a:extLst>
           </p:cNvPr>
@@ -26796,35 +27262,36 @@
           </a:p>
         </p:txBody>
       </p:sp>
-      <p:sp>
-        <p:nvSpPr>
-          <p:cNvPr id="3" name="Marcador de Posição de Conteúdo 2">
+      <p:graphicFrame>
+        <p:nvGraphicFramePr>
+          <p:cNvPr id="4" name="Marcador de Posição de Conteúdo 3">
             <a:extLst>
               <a:ext uri="{FF2B5EF4-FFF2-40B4-BE49-F238E27FC236}">
-                <a16:creationId xmlns:a16="http://schemas.microsoft.com/office/drawing/2014/main" xmlns="" id="{49D54EA5-42AA-4D3C-9345-E8ADD3031118}"/>
+                <a16:creationId xmlns="" xmlns:wpc="http://schemas.microsoft.com/office/word/2010/wordprocessingCanvas" xmlns:cx="http://schemas.microsoft.com/office/drawing/2014/chartex" xmlns:cx1="http://schemas.microsoft.com/office/drawing/2015/9/8/chartex" xmlns:cx2="http://schemas.microsoft.com/office/drawing/2015/10/21/chartex" xmlns:cx3="http://schemas.microsoft.com/office/drawing/2016/5/9/chartex" xmlns:cx4="http://schemas.microsoft.com/office/drawing/2016/5/10/chartex" xmlns:cx5="http://schemas.microsoft.com/office/drawing/2016/5/11/chartex" xmlns:cx6="http://schemas.microsoft.com/office/drawing/2016/5/12/chartex" xmlns:cx7="http://schemas.microsoft.com/office/drawing/2016/5/13/chartex" xmlns:cx8="http://schemas.microsoft.com/office/drawing/2016/5/14/chartex" xmlns:mc="http://schemas.openxmlformats.org/markup-compatibility/2006" xmlns:aink="http://schemas.microsoft.com/office/drawing/2016/ink" xmlns:am3d="http://schemas.microsoft.com/office/drawing/2017/model3d" xmlns:o="urn:schemas-microsoft-com:office:office" xmlns:m="http://schemas.openxmlformats.org/officeDocument/2006/math" xmlns:v="urn:schemas-microsoft-com:vml" xmlns:wp14="http://schemas.microsoft.com/office/word/2010/wordprocessingDrawing" xmlns:wp="http://schemas.openxmlformats.org/drawingml/2006/wordprocessingDrawing" xmlns:w10="urn:schemas-microsoft-com:office:word" xmlns:w="http://schemas.openxmlformats.org/wordprocessingml/2006/main" xmlns:w14="http://schemas.microsoft.com/office/word/2010/wordml" xmlns:w15="http://schemas.microsoft.com/office/word/2012/wordml" xmlns:w16cex="http://schemas.microsoft.com/office/word/2018/wordml/cex" xmlns:w16cid="http://schemas.microsoft.com/office/word/2016/wordml/cid" xmlns:w16="http://schemas.microsoft.com/office/word/2018/wordml" xmlns:w16se="http://schemas.microsoft.com/office/word/2015/wordml/symex" xmlns:wpg="http://schemas.microsoft.com/office/word/2010/wordprocessingGroup" xmlns:wpi="http://schemas.microsoft.com/office/word/2010/wordprocessingInk" xmlns:wne="http://schemas.microsoft.com/office/word/2006/wordml" xmlns:wps="http://schemas.microsoft.com/office/word/2010/wordprocessingShape" xmlns:a16="http://schemas.microsoft.com/office/drawing/2014/main" xmlns:lc="http://schemas.openxmlformats.org/drawingml/2006/lockedCanvas" id="{CE606943-5B6D-4125-966A-862378B307B3}"/>
               </a:ext>
             </a:extLst>
           </p:cNvPr>
-          <p:cNvSpPr>
-            <a:spLocks noGrp="1"/>
-          </p:cNvSpPr>
+          <p:cNvGraphicFramePr>
+            <a:graphicFrameLocks noGrp="1"/>
+          </p:cNvGraphicFramePr>
           <p:nvPr>
             <p:ph idx="1"/>
           </p:nvPr>
-        </p:nvSpPr>
-        <p:spPr/>
-        <p:txBody>
-          <a:bodyPr/>
-          <a:lstStyle/>
-          <a:p>
-            <a:endParaRPr lang="pt-PT" dirty="0"/>
-          </a:p>
-        </p:txBody>
-      </p:sp>
+        </p:nvGraphicFramePr>
+        <p:xfrm>
+          <a:off x="457200" y="1600200"/>
+          <a:ext cx="8229600" cy="4525963"/>
+        </p:xfrm>
+        <a:graphic>
+          <a:graphicData uri="http://schemas.openxmlformats.org/drawingml/2006/chart">
+            <c:chart xmlns:c="http://schemas.openxmlformats.org/drawingml/2006/chart" xmlns:r="http://schemas.openxmlformats.org/officeDocument/2006/relationships" r:id="rId2"/>
+          </a:graphicData>
+        </a:graphic>
+      </p:graphicFrame>
     </p:spTree>
     <p:extLst>
       <p:ext uri="{BB962C8B-B14F-4D97-AF65-F5344CB8AC3E}">
-        <p14:creationId xmlns:p14="http://schemas.microsoft.com/office/powerpoint/2010/main" xmlns="" val="1757695528"/>
+        <p14:creationId xmlns="" xmlns:p14="http://schemas.microsoft.com/office/powerpoint/2010/main" val="1757695528"/>
       </p:ext>
     </p:extLst>
   </p:cSld>
@@ -26856,7 +27323,7 @@
           <p:cNvPr id="5" name="Marcador de Posição de Conteúdo 4">
             <a:extLst>
               <a:ext uri="{FF2B5EF4-FFF2-40B4-BE49-F238E27FC236}">
-                <a16:creationId xmlns:a16="http://schemas.microsoft.com/office/drawing/2014/main" xmlns="" id="{F1769B30-170E-4C01-97F9-B5AB4D72996F}"/>
+                <a16:creationId xmlns="" xmlns:a16="http://schemas.microsoft.com/office/drawing/2014/main" id="{F1769B30-170E-4C01-97F9-B5AB4D72996F}"/>
               </a:ext>
             </a:extLst>
           </p:cNvPr>
@@ -26867,7 +27334,7 @@
             <p:ph idx="1"/>
             <p:extLst>
               <p:ext uri="{D42A27DB-BD31-4B8C-83A1-F6EECF244321}">
-                <p14:modId xmlns:p14="http://schemas.microsoft.com/office/powerpoint/2010/main" xmlns="" val="470110617"/>
+                <p14:modId xmlns="" xmlns:p14="http://schemas.microsoft.com/office/powerpoint/2010/main" val="470110617"/>
               </p:ext>
             </p:extLst>
           </p:nvPr>
@@ -26916,7 +27383,7 @@
     </p:spTree>
     <p:extLst>
       <p:ext uri="{BB962C8B-B14F-4D97-AF65-F5344CB8AC3E}">
-        <p14:creationId xmlns:p14="http://schemas.microsoft.com/office/powerpoint/2010/main" xmlns="" val="748666507"/>
+        <p14:creationId xmlns="" xmlns:p14="http://schemas.microsoft.com/office/powerpoint/2010/main" val="748666507"/>
       </p:ext>
     </p:extLst>
   </p:cSld>
@@ -26948,7 +27415,7 @@
           <p:cNvPr id="4" name="Marcador de Posição de Conteúdo 3">
             <a:extLst>
               <a:ext uri="{FF2B5EF4-FFF2-40B4-BE49-F238E27FC236}">
-                <a16:creationId xmlns:a16="http://schemas.microsoft.com/office/drawing/2014/main" xmlns="" id="{BF54970B-912B-446C-B64A-D4BF8257992B}"/>
+                <a16:creationId xmlns="" xmlns:a16="http://schemas.microsoft.com/office/drawing/2014/main" id="{BF54970B-912B-446C-B64A-D4BF8257992B}"/>
               </a:ext>
             </a:extLst>
           </p:cNvPr>
@@ -26959,7 +27426,7 @@
             <p:ph idx="1"/>
             <p:extLst>
               <p:ext uri="{D42A27DB-BD31-4B8C-83A1-F6EECF244321}">
-                <p14:modId xmlns:p14="http://schemas.microsoft.com/office/powerpoint/2010/main" xmlns="" val="3104962811"/>
+                <p14:modId xmlns="" xmlns:p14="http://schemas.microsoft.com/office/powerpoint/2010/main" val="3104962811"/>
               </p:ext>
             </p:extLst>
           </p:nvPr>
@@ -27008,7 +27475,7 @@
     </p:spTree>
     <p:extLst>
       <p:ext uri="{BB962C8B-B14F-4D97-AF65-F5344CB8AC3E}">
-        <p14:creationId xmlns:p14="http://schemas.microsoft.com/office/powerpoint/2010/main" xmlns="" val="3603114312"/>
+        <p14:creationId xmlns="" xmlns:p14="http://schemas.microsoft.com/office/powerpoint/2010/main" val="3603114312"/>
       </p:ext>
     </p:extLst>
   </p:cSld>
@@ -27070,7 +27537,7 @@
           <p:cNvPr id="7" name="Marcador de Posição de Conteúdo 6">
             <a:extLst>
               <a:ext uri="{FF2B5EF4-FFF2-40B4-BE49-F238E27FC236}">
-                <a16:creationId xmlns:a16="http://schemas.microsoft.com/office/drawing/2014/main" xmlns="" id="{F1C3C96A-7EA7-448A-95DC-E8C965537E74}"/>
+                <a16:creationId xmlns="" xmlns:a16="http://schemas.microsoft.com/office/drawing/2014/main" id="{F1C3C96A-7EA7-448A-95DC-E8C965537E74}"/>
               </a:ext>
             </a:extLst>
           </p:cNvPr>
@@ -27081,7 +27548,7 @@
             <p:ph idx="1"/>
             <p:extLst>
               <p:ext uri="{D42A27DB-BD31-4B8C-83A1-F6EECF244321}">
-                <p14:modId xmlns:p14="http://schemas.microsoft.com/office/powerpoint/2010/main" xmlns="" val="884974184"/>
+                <p14:modId xmlns="" xmlns:p14="http://schemas.microsoft.com/office/powerpoint/2010/main" val="884974184"/>
               </p:ext>
             </p:extLst>
           </p:nvPr>
@@ -27101,7 +27568,7 @@
           <p:cNvPr id="8" name="CaixaDeTexto 7">
             <a:extLst>
               <a:ext uri="{FF2B5EF4-FFF2-40B4-BE49-F238E27FC236}">
-                <a16:creationId xmlns:a16="http://schemas.microsoft.com/office/drawing/2014/main" xmlns="" id="{FD3EDC28-4E6B-40B4-B811-4ACE3E528CEB}"/>
+                <a16:creationId xmlns="" xmlns:a16="http://schemas.microsoft.com/office/drawing/2014/main" id="{FD3EDC28-4E6B-40B4-B811-4ACE3E528CEB}"/>
               </a:ext>
             </a:extLst>
           </p:cNvPr>
@@ -27154,7 +27621,7 @@
           <p:cNvPr id="9" name="CaixaDeTexto 8">
             <a:extLst>
               <a:ext uri="{FF2B5EF4-FFF2-40B4-BE49-F238E27FC236}">
-                <a16:creationId xmlns:a16="http://schemas.microsoft.com/office/drawing/2014/main" xmlns="" id="{DDDD25B7-919E-4EC9-A3A3-1B6A92C82AC8}"/>
+                <a16:creationId xmlns="" xmlns:a16="http://schemas.microsoft.com/office/drawing/2014/main" id="{DDDD25B7-919E-4EC9-A3A3-1B6A92C82AC8}"/>
               </a:ext>
             </a:extLst>
           </p:cNvPr>
@@ -27207,7 +27674,7 @@
           <p:cNvPr id="10" name="CaixaDeTexto 9">
             <a:extLst>
               <a:ext uri="{FF2B5EF4-FFF2-40B4-BE49-F238E27FC236}">
-                <a16:creationId xmlns:a16="http://schemas.microsoft.com/office/drawing/2014/main" xmlns="" id="{BA5C7190-A430-4B23-A1EF-9FDDA2D6F729}"/>
+                <a16:creationId xmlns="" xmlns:a16="http://schemas.microsoft.com/office/drawing/2014/main" id="{BA5C7190-A430-4B23-A1EF-9FDDA2D6F729}"/>
               </a:ext>
             </a:extLst>
           </p:cNvPr>
@@ -27260,7 +27727,7 @@
           <p:cNvPr id="11" name="CaixaDeTexto 10">
             <a:extLst>
               <a:ext uri="{FF2B5EF4-FFF2-40B4-BE49-F238E27FC236}">
-                <a16:creationId xmlns:a16="http://schemas.microsoft.com/office/drawing/2014/main" xmlns="" id="{FBD5A858-BD73-44C6-B9C4-D6704478D5A6}"/>
+                <a16:creationId xmlns="" xmlns:a16="http://schemas.microsoft.com/office/drawing/2014/main" id="{FBD5A858-BD73-44C6-B9C4-D6704478D5A6}"/>
               </a:ext>
             </a:extLst>
           </p:cNvPr>
@@ -27338,7 +27805,7 @@
           <p:cNvPr id="4" name="Marcador de Posição de Conteúdo 3">
             <a:extLst>
               <a:ext uri="{FF2B5EF4-FFF2-40B4-BE49-F238E27FC236}">
-                <a16:creationId xmlns:a16="http://schemas.microsoft.com/office/drawing/2014/main" xmlns="" id="{80BCB2C2-B3D7-42A7-BBEB-DA1DF190E1B1}"/>
+                <a16:creationId xmlns="" xmlns:a16="http://schemas.microsoft.com/office/drawing/2014/main" id="{80BCB2C2-B3D7-42A7-BBEB-DA1DF190E1B1}"/>
               </a:ext>
             </a:extLst>
           </p:cNvPr>
@@ -27349,7 +27816,7 @@
             <p:ph idx="1"/>
             <p:extLst>
               <p:ext uri="{D42A27DB-BD31-4B8C-83A1-F6EECF244321}">
-                <p14:modId xmlns:p14="http://schemas.microsoft.com/office/powerpoint/2010/main" xmlns="" val="3156271480"/>
+                <p14:modId xmlns="" xmlns:p14="http://schemas.microsoft.com/office/powerpoint/2010/main" val="3156271480"/>
               </p:ext>
             </p:extLst>
           </p:nvPr>
@@ -27398,7 +27865,7 @@
     </p:spTree>
     <p:extLst>
       <p:ext uri="{BB962C8B-B14F-4D97-AF65-F5344CB8AC3E}">
-        <p14:creationId xmlns:p14="http://schemas.microsoft.com/office/powerpoint/2010/main" xmlns="" val="804293094"/>
+        <p14:creationId xmlns="" xmlns:p14="http://schemas.microsoft.com/office/powerpoint/2010/main" val="804293094"/>
       </p:ext>
     </p:extLst>
   </p:cSld>
@@ -27460,7 +27927,7 @@
           <p:cNvPr id="6" name="CaixaDeTexto 5">
             <a:extLst>
               <a:ext uri="{FF2B5EF4-FFF2-40B4-BE49-F238E27FC236}">
-                <a16:creationId xmlns:a16="http://schemas.microsoft.com/office/drawing/2014/main" xmlns="" id="{5870344C-C64C-4E8A-867A-FD892E0C29DD}"/>
+                <a16:creationId xmlns="" xmlns:a16="http://schemas.microsoft.com/office/drawing/2014/main" id="{5870344C-C64C-4E8A-867A-FD892E0C29DD}"/>
               </a:ext>
             </a:extLst>
           </p:cNvPr>
@@ -27513,7 +27980,7 @@
           <p:cNvPr id="7" name="Marcador de Posição de Conteúdo 6">
             <a:extLst>
               <a:ext uri="{FF2B5EF4-FFF2-40B4-BE49-F238E27FC236}">
-                <a16:creationId xmlns:a16="http://schemas.microsoft.com/office/drawing/2014/main" xmlns="" id="{D179913A-1725-433B-9FA5-D9223E6DD9C1}"/>
+                <a16:creationId xmlns="" xmlns:a16="http://schemas.microsoft.com/office/drawing/2014/main" id="{D179913A-1725-433B-9FA5-D9223E6DD9C1}"/>
               </a:ext>
             </a:extLst>
           </p:cNvPr>
@@ -27524,7 +27991,7 @@
             <p:ph idx="1"/>
             <p:extLst>
               <p:ext uri="{D42A27DB-BD31-4B8C-83A1-F6EECF244321}">
-                <p14:modId xmlns:p14="http://schemas.microsoft.com/office/powerpoint/2010/main" xmlns="" val="2169694937"/>
+                <p14:modId xmlns="" xmlns:p14="http://schemas.microsoft.com/office/powerpoint/2010/main" val="2169694937"/>
               </p:ext>
             </p:extLst>
           </p:nvPr>
@@ -27544,7 +28011,7 @@
           <p:cNvPr id="8" name="CaixaDeTexto 7">
             <a:extLst>
               <a:ext uri="{FF2B5EF4-FFF2-40B4-BE49-F238E27FC236}">
-                <a16:creationId xmlns:a16="http://schemas.microsoft.com/office/drawing/2014/main" xmlns="" id="{F25EB4B5-7E3B-430B-94D6-44507A08ABBF}"/>
+                <a16:creationId xmlns="" xmlns:a16="http://schemas.microsoft.com/office/drawing/2014/main" id="{F25EB4B5-7E3B-430B-94D6-44507A08ABBF}"/>
               </a:ext>
             </a:extLst>
           </p:cNvPr>
@@ -27597,7 +28064,7 @@
           <p:cNvPr id="9" name="CaixaDeTexto 8">
             <a:extLst>
               <a:ext uri="{FF2B5EF4-FFF2-40B4-BE49-F238E27FC236}">
-                <a16:creationId xmlns:a16="http://schemas.microsoft.com/office/drawing/2014/main" xmlns="" id="{E5EDFA8F-4109-44B8-A4F9-F9C3EDD6C6F9}"/>
+                <a16:creationId xmlns="" xmlns:a16="http://schemas.microsoft.com/office/drawing/2014/main" id="{E5EDFA8F-4109-44B8-A4F9-F9C3EDD6C6F9}"/>
               </a:ext>
             </a:extLst>
           </p:cNvPr>
@@ -27650,7 +28117,7 @@
           <p:cNvPr id="10" name="CaixaDeTexto 9">
             <a:extLst>
               <a:ext uri="{FF2B5EF4-FFF2-40B4-BE49-F238E27FC236}">
-                <a16:creationId xmlns:a16="http://schemas.microsoft.com/office/drawing/2014/main" xmlns="" id="{4347C280-ED3B-43B6-B433-85A10ADEDF8B}"/>
+                <a16:creationId xmlns="" xmlns:a16="http://schemas.microsoft.com/office/drawing/2014/main" id="{4347C280-ED3B-43B6-B433-85A10ADEDF8B}"/>
               </a:ext>
             </a:extLst>
           </p:cNvPr>
@@ -27758,7 +28225,7 @@
           <p:cNvPr id="6" name="Marcador de Posição de Conteúdo 5">
             <a:extLst>
               <a:ext uri="{FF2B5EF4-FFF2-40B4-BE49-F238E27FC236}">
-                <a16:creationId xmlns:a16="http://schemas.microsoft.com/office/drawing/2014/main" xmlns="" id="{C5FF8952-2B9F-44EA-A47C-E51E45773827}"/>
+                <a16:creationId xmlns="" xmlns:a16="http://schemas.microsoft.com/office/drawing/2014/main" id="{C5FF8952-2B9F-44EA-A47C-E51E45773827}"/>
               </a:ext>
             </a:extLst>
           </p:cNvPr>
@@ -27769,7 +28236,7 @@
             <p:ph idx="1"/>
             <p:extLst>
               <p:ext uri="{D42A27DB-BD31-4B8C-83A1-F6EECF244321}">
-                <p14:modId xmlns:p14="http://schemas.microsoft.com/office/powerpoint/2010/main" xmlns="" val="1472418342"/>
+                <p14:modId xmlns="" xmlns:p14="http://schemas.microsoft.com/office/powerpoint/2010/main" val="1472418342"/>
               </p:ext>
             </p:extLst>
           </p:nvPr>
@@ -27789,7 +28256,7 @@
           <p:cNvPr id="7" name="CaixaDeTexto 6">
             <a:extLst>
               <a:ext uri="{FF2B5EF4-FFF2-40B4-BE49-F238E27FC236}">
-                <a16:creationId xmlns:a16="http://schemas.microsoft.com/office/drawing/2014/main" xmlns="" id="{187D22F3-8904-4BF0-BF8D-89C9EBBF6149}"/>
+                <a16:creationId xmlns="" xmlns:a16="http://schemas.microsoft.com/office/drawing/2014/main" id="{187D22F3-8904-4BF0-BF8D-89C9EBBF6149}"/>
               </a:ext>
             </a:extLst>
           </p:cNvPr>
@@ -27842,7 +28309,7 @@
           <p:cNvPr id="8" name="CaixaDeTexto 7">
             <a:extLst>
               <a:ext uri="{FF2B5EF4-FFF2-40B4-BE49-F238E27FC236}">
-                <a16:creationId xmlns:a16="http://schemas.microsoft.com/office/drawing/2014/main" xmlns="" id="{A1F57BEC-B2B0-40E6-A38F-DA55273CBC1F}"/>
+                <a16:creationId xmlns="" xmlns:a16="http://schemas.microsoft.com/office/drawing/2014/main" id="{A1F57BEC-B2B0-40E6-A38F-DA55273CBC1F}"/>
               </a:ext>
             </a:extLst>
           </p:cNvPr>
@@ -27895,7 +28362,7 @@
           <p:cNvPr id="9" name="CaixaDeTexto 8">
             <a:extLst>
               <a:ext uri="{FF2B5EF4-FFF2-40B4-BE49-F238E27FC236}">
-                <a16:creationId xmlns:a16="http://schemas.microsoft.com/office/drawing/2014/main" xmlns="" id="{0246E122-B446-4C67-ABD0-5C14CB906ACF}"/>
+                <a16:creationId xmlns="" xmlns:a16="http://schemas.microsoft.com/office/drawing/2014/main" id="{0246E122-B446-4C67-ABD0-5C14CB906ACF}"/>
               </a:ext>
             </a:extLst>
           </p:cNvPr>
@@ -27948,7 +28415,7 @@
           <p:cNvPr id="10" name="CaixaDeTexto 9">
             <a:extLst>
               <a:ext uri="{FF2B5EF4-FFF2-40B4-BE49-F238E27FC236}">
-                <a16:creationId xmlns:a16="http://schemas.microsoft.com/office/drawing/2014/main" xmlns="" id="{065159E3-F126-45B3-8F7F-E0F906111C4B}"/>
+                <a16:creationId xmlns="" xmlns:a16="http://schemas.microsoft.com/office/drawing/2014/main" id="{065159E3-F126-45B3-8F7F-E0F906111C4B}"/>
               </a:ext>
             </a:extLst>
           </p:cNvPr>
@@ -28056,7 +28523,7 @@
           <p:cNvPr id="5" name="CaixaDeTexto 2">
             <a:extLst>
               <a:ext uri="{FF2B5EF4-FFF2-40B4-BE49-F238E27FC236}">
-                <a16:creationId xmlns:a16="http://schemas.microsoft.com/office/drawing/2014/main" xmlns="" id="{7634EFC6-9C86-4CE8-A64E-64BAD93FAF91}"/>
+                <a16:creationId xmlns="" xmlns:a16="http://schemas.microsoft.com/office/drawing/2014/main" id="{7634EFC6-9C86-4CE8-A64E-64BAD93FAF91}"/>
               </a:ext>
             </a:extLst>
           </p:cNvPr>
@@ -28173,7 +28640,7 @@
           <p:cNvPr id="9" name="Marcador de Posição de Conteúdo 8">
             <a:extLst>
               <a:ext uri="{FF2B5EF4-FFF2-40B4-BE49-F238E27FC236}">
-                <a16:creationId xmlns:a16="http://schemas.microsoft.com/office/drawing/2014/main" xmlns="" id="{D02754CF-C562-4B92-807F-B2CA86C10B10}"/>
+                <a16:creationId xmlns="" xmlns:a16="http://schemas.microsoft.com/office/drawing/2014/main" id="{D02754CF-C562-4B92-807F-B2CA86C10B10}"/>
               </a:ext>
             </a:extLst>
           </p:cNvPr>
@@ -28184,7 +28651,7 @@
             <p:ph idx="1"/>
             <p:extLst>
               <p:ext uri="{D42A27DB-BD31-4B8C-83A1-F6EECF244321}">
-                <p14:modId xmlns:p14="http://schemas.microsoft.com/office/powerpoint/2010/main" xmlns="" val="3987888895"/>
+                <p14:modId xmlns="" xmlns:p14="http://schemas.microsoft.com/office/powerpoint/2010/main" val="3987888895"/>
               </p:ext>
             </p:extLst>
           </p:nvPr>
@@ -28204,7 +28671,7 @@
           <p:cNvPr id="10" name="CaixaDeTexto 9">
             <a:extLst>
               <a:ext uri="{FF2B5EF4-FFF2-40B4-BE49-F238E27FC236}">
-                <a16:creationId xmlns:a16="http://schemas.microsoft.com/office/drawing/2014/main" xmlns="" id="{2963C07F-1FFD-4BDF-8711-46FA3346BDFA}"/>
+                <a16:creationId xmlns="" xmlns:a16="http://schemas.microsoft.com/office/drawing/2014/main" id="{2963C07F-1FFD-4BDF-8711-46FA3346BDFA}"/>
               </a:ext>
             </a:extLst>
           </p:cNvPr>
@@ -28257,7 +28724,7 @@
           <p:cNvPr id="11" name="CaixaDeTexto 10">
             <a:extLst>
               <a:ext uri="{FF2B5EF4-FFF2-40B4-BE49-F238E27FC236}">
-                <a16:creationId xmlns:a16="http://schemas.microsoft.com/office/drawing/2014/main" xmlns="" id="{B288401D-41FB-4EFF-89AD-97E8AE3563D0}"/>
+                <a16:creationId xmlns="" xmlns:a16="http://schemas.microsoft.com/office/drawing/2014/main" id="{B288401D-41FB-4EFF-89AD-97E8AE3563D0}"/>
               </a:ext>
             </a:extLst>
           </p:cNvPr>
@@ -28310,7 +28777,7 @@
           <p:cNvPr id="12" name="CaixaDeTexto 11">
             <a:extLst>
               <a:ext uri="{FF2B5EF4-FFF2-40B4-BE49-F238E27FC236}">
-                <a16:creationId xmlns:a16="http://schemas.microsoft.com/office/drawing/2014/main" xmlns="" id="{72D704DD-A4C4-48F4-80BF-8720058823E0}"/>
+                <a16:creationId xmlns="" xmlns:a16="http://schemas.microsoft.com/office/drawing/2014/main" id="{72D704DD-A4C4-48F4-80BF-8720058823E0}"/>
               </a:ext>
             </a:extLst>
           </p:cNvPr>
@@ -28418,7 +28885,7 @@
           <p:cNvPr id="10" name="Marcador de Posição de Conteúdo 9">
             <a:extLst>
               <a:ext uri="{FF2B5EF4-FFF2-40B4-BE49-F238E27FC236}">
-                <a16:creationId xmlns:a16="http://schemas.microsoft.com/office/drawing/2014/main" xmlns="" id="{2368EF70-BFD1-4DDA-94F1-FEB9683AAEF1}"/>
+                <a16:creationId xmlns="" xmlns:a16="http://schemas.microsoft.com/office/drawing/2014/main" id="{2368EF70-BFD1-4DDA-94F1-FEB9683AAEF1}"/>
               </a:ext>
             </a:extLst>
           </p:cNvPr>
@@ -28429,7 +28896,7 @@
             <p:ph idx="1"/>
             <p:extLst>
               <p:ext uri="{D42A27DB-BD31-4B8C-83A1-F6EECF244321}">
-                <p14:modId xmlns:p14="http://schemas.microsoft.com/office/powerpoint/2010/main" xmlns="" val="2682736835"/>
+                <p14:modId xmlns="" xmlns:p14="http://schemas.microsoft.com/office/powerpoint/2010/main" val="2682736835"/>
               </p:ext>
             </p:extLst>
           </p:nvPr>
@@ -28449,7 +28916,7 @@
           <p:cNvPr id="12" name="CaixaDeTexto 11">
             <a:extLst>
               <a:ext uri="{FF2B5EF4-FFF2-40B4-BE49-F238E27FC236}">
-                <a16:creationId xmlns:a16="http://schemas.microsoft.com/office/drawing/2014/main" xmlns="" id="{E135EF83-5C94-4326-89C4-AF4839F4375B}"/>
+                <a16:creationId xmlns="" xmlns:a16="http://schemas.microsoft.com/office/drawing/2014/main" id="{E135EF83-5C94-4326-89C4-AF4839F4375B}"/>
               </a:ext>
             </a:extLst>
           </p:cNvPr>
@@ -28502,7 +28969,7 @@
           <p:cNvPr id="13" name="CaixaDeTexto 12">
             <a:extLst>
               <a:ext uri="{FF2B5EF4-FFF2-40B4-BE49-F238E27FC236}">
-                <a16:creationId xmlns:a16="http://schemas.microsoft.com/office/drawing/2014/main" xmlns="" id="{79DB4884-DFFB-4DCD-8DB0-C21A204B1739}"/>
+                <a16:creationId xmlns="" xmlns:a16="http://schemas.microsoft.com/office/drawing/2014/main" id="{79DB4884-DFFB-4DCD-8DB0-C21A204B1739}"/>
               </a:ext>
             </a:extLst>
           </p:cNvPr>
@@ -28555,7 +29022,7 @@
           <p:cNvPr id="14" name="CaixaDeTexto 13">
             <a:extLst>
               <a:ext uri="{FF2B5EF4-FFF2-40B4-BE49-F238E27FC236}">
-                <a16:creationId xmlns:a16="http://schemas.microsoft.com/office/drawing/2014/main" xmlns="" id="{34A79EAC-5F2C-4772-994B-014EBEDB0E87}"/>
+                <a16:creationId xmlns="" xmlns:a16="http://schemas.microsoft.com/office/drawing/2014/main" id="{34A79EAC-5F2C-4772-994B-014EBEDB0E87}"/>
               </a:ext>
             </a:extLst>
           </p:cNvPr>
@@ -28608,7 +29075,7 @@
           <p:cNvPr id="16" name="CaixaDeTexto 15">
             <a:extLst>
               <a:ext uri="{FF2B5EF4-FFF2-40B4-BE49-F238E27FC236}">
-                <a16:creationId xmlns:a16="http://schemas.microsoft.com/office/drawing/2014/main" xmlns="" id="{B32B7E93-6041-44AC-BAA7-59C9D3ED44C6}"/>
+                <a16:creationId xmlns="" xmlns:a16="http://schemas.microsoft.com/office/drawing/2014/main" id="{B32B7E93-6041-44AC-BAA7-59C9D3ED44C6}"/>
               </a:ext>
             </a:extLst>
           </p:cNvPr>
@@ -28716,7 +29183,7 @@
           <p:cNvPr id="6" name="Marcador de Posição de Conteúdo 5">
             <a:extLst>
               <a:ext uri="{FF2B5EF4-FFF2-40B4-BE49-F238E27FC236}">
-                <a16:creationId xmlns:a16="http://schemas.microsoft.com/office/drawing/2014/main" xmlns="" id="{8780E141-24CE-4156-916E-834FA83293C5}"/>
+                <a16:creationId xmlns="" xmlns:a16="http://schemas.microsoft.com/office/drawing/2014/main" id="{8780E141-24CE-4156-916E-834FA83293C5}"/>
               </a:ext>
             </a:extLst>
           </p:cNvPr>
@@ -28727,7 +29194,7 @@
             <p:ph idx="1"/>
             <p:extLst>
               <p:ext uri="{D42A27DB-BD31-4B8C-83A1-F6EECF244321}">
-                <p14:modId xmlns:p14="http://schemas.microsoft.com/office/powerpoint/2010/main" xmlns="" val="4266772448"/>
+                <p14:modId xmlns="" xmlns:p14="http://schemas.microsoft.com/office/powerpoint/2010/main" val="4266772448"/>
               </p:ext>
             </p:extLst>
           </p:nvPr>
@@ -28798,7 +29265,7 @@
         </p:txBody>
       </p:sp>
       <mc:AlternateContent xmlns:mc="http://schemas.openxmlformats.org/markup-compatibility/2006">
-        <mc:Choice xmlns:a14="http://schemas.microsoft.com/office/drawing/2010/main" xmlns="" Requires="a14">
+        <mc:Choice xmlns="" xmlns:a14="http://schemas.microsoft.com/office/drawing/2010/main" Requires="a14">
           <p:sp>
             <p:nvSpPr>
               <p:cNvPr id="7" name="CaixaDeTexto 1">
@@ -28947,7 +29414,7 @@
               <p:cNvPr id="7" name="CaixaDeTexto 1">
                 <a:extLst>
                   <a:ext uri="{FF2B5EF4-FFF2-40B4-BE49-F238E27FC236}">
-                    <a16:creationId xmlns:a16="http://schemas.microsoft.com/office/drawing/2014/main" xmlns="" xmlns:a14="http://schemas.microsoft.com/office/drawing/2010/main" id="{A2FBD298-09E7-4CB1-8E47-01CB023EFC57}"/>
+                    <a16:creationId xmlns:a14="http://schemas.microsoft.com/office/drawing/2010/main" xmlns="" xmlns:a16="http://schemas.microsoft.com/office/drawing/2014/main" id="{A2FBD298-09E7-4CB1-8E47-01CB023EFC57}"/>
                   </a:ext>
                 </a:extLst>
               </p:cNvPr>
@@ -28991,7 +29458,7 @@
           <p:cNvPr id="8" name="Marcador de Posição de Conteúdo 7">
             <a:extLst>
               <a:ext uri="{FF2B5EF4-FFF2-40B4-BE49-F238E27FC236}">
-                <a16:creationId xmlns:a16="http://schemas.microsoft.com/office/drawing/2014/main" xmlns="" id="{3251F279-45CA-49E0-8EBB-A3643B355BC6}"/>
+                <a16:creationId xmlns="" xmlns:a16="http://schemas.microsoft.com/office/drawing/2014/main" id="{3251F279-45CA-49E0-8EBB-A3643B355BC6}"/>
               </a:ext>
             </a:extLst>
           </p:cNvPr>
@@ -29002,7 +29469,7 @@
             <p:ph idx="1"/>
             <p:extLst>
               <p:ext uri="{D42A27DB-BD31-4B8C-83A1-F6EECF244321}">
-                <p14:modId xmlns:p14="http://schemas.microsoft.com/office/powerpoint/2010/main" xmlns="" val="176733401"/>
+                <p14:modId xmlns="" xmlns:p14="http://schemas.microsoft.com/office/powerpoint/2010/main" val="176733401"/>
               </p:ext>
             </p:extLst>
           </p:nvPr>
@@ -29077,7 +29544,7 @@
           <p:cNvPr id="7" name="Marcador de Posição de Conteúdo 6">
             <a:extLst>
               <a:ext uri="{FF2B5EF4-FFF2-40B4-BE49-F238E27FC236}">
-                <a16:creationId xmlns:a16="http://schemas.microsoft.com/office/drawing/2014/main" xmlns="" id="{5A9E22EA-D002-4787-9FD1-7A529670444E}"/>
+                <a16:creationId xmlns="" xmlns:a16="http://schemas.microsoft.com/office/drawing/2014/main" id="{5A9E22EA-D002-4787-9FD1-7A529670444E}"/>
               </a:ext>
             </a:extLst>
           </p:cNvPr>
@@ -29088,7 +29555,7 @@
             <p:ph idx="1"/>
             <p:extLst>
               <p:ext uri="{D42A27DB-BD31-4B8C-83A1-F6EECF244321}">
-                <p14:modId xmlns:p14="http://schemas.microsoft.com/office/powerpoint/2010/main" xmlns="" val="1127316651"/>
+                <p14:modId xmlns="" xmlns:p14="http://schemas.microsoft.com/office/powerpoint/2010/main" val="1127316651"/>
               </p:ext>
             </p:extLst>
           </p:nvPr>

</xml_diff>